<commit_message>
powerpoint and pdf version of the figures
</commit_message>
<xml_diff>
--- a/ms_fig.pptx
+++ b/ms_fig.pptx
@@ -8,11 +8,11 @@
     <p:notesMasterId r:id="rId7"/>
   </p:notesMasterIdLst>
   <p:sldIdLst>
-    <p:sldId id="256" r:id="rId2"/>
-    <p:sldId id="257" r:id="rId3"/>
-    <p:sldId id="258" r:id="rId4"/>
-    <p:sldId id="259" r:id="rId5"/>
-    <p:sldId id="260" r:id="rId6"/>
+    <p:sldId id="263" r:id="rId2"/>
+    <p:sldId id="264" r:id="rId3"/>
+    <p:sldId id="256" r:id="rId4"/>
+    <p:sldId id="261" r:id="rId5"/>
+    <p:sldId id="262" r:id="rId6"/>
   </p:sldIdLst>
   <p:sldSz cx="12192000" cy="6858000"/>
   <p:notesSz cx="6858000" cy="9144000"/>
@@ -111,6 +111,11 @@
       </a:defRPr>
     </a:lvl9pPr>
   </p:defaultTextStyle>
+  <p:extLst>
+    <p:ext uri="{EFAFB233-063F-42B5-8137-9DF3F51BA10A}">
+      <p15:sldGuideLst xmlns:p15="http://schemas.microsoft.com/office/powerpoint/2012/main"/>
+    </p:ext>
+  </p:extLst>
 </p:presentation>
 </file>
 
@@ -196,7 +201,7 @@
           <a:p>
             <a:fld id="{3959A119-9587-4BAF-8600-E8138F86BBBE}" type="datetimeFigureOut">
               <a:rPr lang="en-US" smtClean="0"/>
-              <a:t>28/12/2015</a:t>
+              <a:t>17/02/2016</a:t>
             </a:fld>
             <a:endParaRPr lang="en-US"/>
           </a:p>
@@ -510,12 +515,35 @@
           <a:p>
             <a:r>
               <a:rPr lang="en-US" dirty="0" smtClean="0"/>
-              <a:t>Solar radiation was increased</a:t>
+              <a:t>Net energy gain for different values</a:t>
             </a:r>
             <a:r>
               <a:rPr lang="en-US" baseline="0" dirty="0" smtClean="0"/>
-              <a:t> from 0 to 0.25 of maximum value during 6 hours. Temperature is fixed. Wind speed 0.5 m/s</a:t>
-            </a:r>
+              <a:t> of b_3</a:t>
+            </a:r>
+          </a:p>
+          <a:p>
+            <a:pPr marL="228600" indent="-228600">
+              <a:buAutoNum type="alphaLcParenR"/>
+            </a:pPr>
+            <a:r>
+              <a:rPr lang="en-US" baseline="0" dirty="0" smtClean="0"/>
+              <a:t>Time is limiting (0.5 hours)</a:t>
+            </a:r>
+          </a:p>
+          <a:p>
+            <a:pPr marL="228600" indent="-228600">
+              <a:buAutoNum type="alphaLcParenR"/>
+            </a:pPr>
+            <a:r>
+              <a:rPr lang="en-US" baseline="0" dirty="0" smtClean="0"/>
+              <a:t>Resource is limiting (20 gram)</a:t>
+            </a:r>
+          </a:p>
+          <a:p>
+            <a:pPr marL="0" indent="0">
+              <a:buNone/>
+            </a:pPr>
             <a:endParaRPr lang="en-US" dirty="0"/>
           </a:p>
         </p:txBody>
@@ -546,7 +574,7 @@
     </p:spTree>
     <p:extLst>
       <p:ext uri="{BB962C8B-B14F-4D97-AF65-F5344CB8AC3E}">
-        <p14:creationId xmlns:p14="http://schemas.microsoft.com/office/powerpoint/2010/main" val="3572384472"/>
+        <p14:creationId xmlns:p14="http://schemas.microsoft.com/office/powerpoint/2010/main" val="197357618"/>
       </p:ext>
     </p:extLst>
   </p:cSld>
@@ -602,13 +630,39 @@
           <a:p>
             <a:r>
               <a:rPr lang="en-US" dirty="0" smtClean="0"/>
-              <a:t>Solid</a:t>
+              <a:t>N</a:t>
             </a:r>
             <a:r>
               <a:rPr lang="en-US" baseline="0" dirty="0" smtClean="0"/>
-              <a:t> default, dashed = small conductance between thorax and the rest of the body, temperature fixed at 20 degree C. Blue starts at sunrise, red starts at sunrise plus 3 hours.  </a:t>
-            </a:r>
-            <a:endParaRPr lang="en-US" dirty="0"/>
+              <a:t>et energy gain as a function of body size for different resource quality (epsilon)</a:t>
+            </a:r>
+          </a:p>
+          <a:p>
+            <a:pPr marL="228600" indent="-228600">
+              <a:buAutoNum type="alphaLcParenR"/>
+            </a:pPr>
+            <a:r>
+              <a:rPr lang="en-US" baseline="0" dirty="0" smtClean="0"/>
+              <a:t>Shaded regions show conditions where the net energy gain is maximized for intermediate body size given that resource quality (horizontal line) falls within. (blue = 15 , red = 35).</a:t>
+            </a:r>
+          </a:p>
+          <a:p>
+            <a:pPr marL="228600" indent="-228600">
+              <a:buAutoNum type="alphaLcParenR"/>
+            </a:pPr>
+            <a:r>
+              <a:rPr lang="en-US" baseline="0" dirty="0" smtClean="0"/>
+              <a:t>Example of patterns of energy gain from a)</a:t>
+            </a:r>
+          </a:p>
+          <a:p>
+            <a:pPr marL="0" indent="0">
+              <a:buNone/>
+            </a:pPr>
+            <a:r>
+              <a:rPr lang="en-US" baseline="0" dirty="0" smtClean="0"/>
+              <a:t>Other parameters: b3 = 0.5, foraging time = 1hour</a:t>
+            </a:r>
           </a:p>
         </p:txBody>
       </p:sp>
@@ -638,7 +692,440 @@
     </p:spTree>
     <p:extLst>
       <p:ext uri="{BB962C8B-B14F-4D97-AF65-F5344CB8AC3E}">
-        <p14:creationId xmlns:p14="http://schemas.microsoft.com/office/powerpoint/2010/main" val="1628358336"/>
+        <p14:creationId xmlns:p14="http://schemas.microsoft.com/office/powerpoint/2010/main" val="4171043084"/>
+      </p:ext>
+    </p:extLst>
+  </p:cSld>
+  <p:clrMapOvr>
+    <a:masterClrMapping/>
+  </p:clrMapOvr>
+</p:notes>
+</file>
+
+<file path=ppt/notesSlides/notesSlide3.xml><?xml version="1.0" encoding="utf-8"?>
+<p:notes xmlns:a="http://schemas.openxmlformats.org/drawingml/2006/main" xmlns:r="http://schemas.openxmlformats.org/officeDocument/2006/relationships" xmlns:p="http://schemas.openxmlformats.org/presentationml/2006/main">
+  <p:cSld>
+    <p:spTree>
+      <p:nvGrpSpPr>
+        <p:cNvPr id="1" name=""/>
+        <p:cNvGrpSpPr/>
+        <p:nvPr/>
+      </p:nvGrpSpPr>
+      <p:grpSpPr>
+        <a:xfrm>
+          <a:off x="0" y="0"/>
+          <a:ext cx="0" cy="0"/>
+          <a:chOff x="0" y="0"/>
+          <a:chExt cx="0" cy="0"/>
+        </a:xfrm>
+      </p:grpSpPr>
+      <p:sp>
+        <p:nvSpPr>
+          <p:cNvPr id="2" name="Slide Image Placeholder 1"/>
+          <p:cNvSpPr>
+            <a:spLocks noGrp="1" noRot="1" noChangeAspect="1"/>
+          </p:cNvSpPr>
+          <p:nvPr>
+            <p:ph type="sldImg"/>
+          </p:nvPr>
+        </p:nvSpPr>
+        <p:spPr/>
+      </p:sp>
+      <p:sp>
+        <p:nvSpPr>
+          <p:cNvPr id="3" name="Notes Placeholder 2"/>
+          <p:cNvSpPr>
+            <a:spLocks noGrp="1"/>
+          </p:cNvSpPr>
+          <p:nvPr>
+            <p:ph type="body" idx="1"/>
+          </p:nvPr>
+        </p:nvSpPr>
+        <p:spPr/>
+        <p:txBody>
+          <a:bodyPr/>
+          <a:lstStyle/>
+          <a:p>
+            <a:pPr marL="0" indent="0">
+              <a:buNone/>
+            </a:pPr>
+            <a:r>
+              <a:rPr lang="en-US" dirty="0" smtClean="0"/>
+              <a:t>Minimum</a:t>
+            </a:r>
+            <a:r>
+              <a:rPr lang="en-US" baseline="0" dirty="0" smtClean="0"/>
+              <a:t> environmental temperature for warm-up to succeed.</a:t>
+            </a:r>
+            <a:endParaRPr lang="en-US" dirty="0" smtClean="0"/>
+          </a:p>
+          <a:p>
+            <a:pPr marL="228600" indent="-228600">
+              <a:buAutoNum type="alphaLcParenR"/>
+            </a:pPr>
+            <a:r>
+              <a:rPr lang="en-US" dirty="0" smtClean="0"/>
+              <a:t>Ectotherm:</a:t>
+            </a:r>
+            <a:r>
+              <a:rPr lang="en-US" baseline="0" dirty="0" smtClean="0"/>
+              <a:t> f</a:t>
+            </a:r>
+            <a:r>
+              <a:rPr lang="en-US" dirty="0" smtClean="0"/>
+              <a:t>ree convection, conductance</a:t>
+            </a:r>
+            <a:r>
+              <a:rPr lang="en-US" baseline="0" dirty="0" smtClean="0"/>
+              <a:t> is low (0.1).</a:t>
+            </a:r>
+          </a:p>
+          <a:p>
+            <a:pPr marL="228600" indent="-228600">
+              <a:buAutoNum type="alphaLcParenR"/>
+            </a:pPr>
+            <a:r>
+              <a:rPr lang="en-US" baseline="0" dirty="0" smtClean="0"/>
+              <a:t>Ectotherm: laminar convection, conductance is default (1)</a:t>
+            </a:r>
+          </a:p>
+          <a:p>
+            <a:pPr marL="228600" indent="-228600">
+              <a:buAutoNum type="alphaLcParenR"/>
+            </a:pPr>
+            <a:r>
+              <a:rPr lang="en-US" baseline="0" dirty="0" smtClean="0"/>
+              <a:t>Endotherm: laminar convection (aw = 1.25)</a:t>
+            </a:r>
+          </a:p>
+          <a:p>
+            <a:pPr marL="0" indent="0">
+              <a:buNone/>
+            </a:pPr>
+            <a:r>
+              <a:rPr lang="en-US" dirty="0" smtClean="0"/>
+              <a:t>Solar radiation was increased</a:t>
+            </a:r>
+            <a:r>
+              <a:rPr lang="en-US" baseline="0" dirty="0" smtClean="0"/>
+              <a:t> from 0 to 0.25 of maximum value during 6 hours. Temperature is fixed. Wind speed 0.1 m/s</a:t>
+            </a:r>
+            <a:endParaRPr lang="en-US" dirty="0"/>
+          </a:p>
+        </p:txBody>
+      </p:sp>
+      <p:sp>
+        <p:nvSpPr>
+          <p:cNvPr id="4" name="Slide Number Placeholder 3"/>
+          <p:cNvSpPr>
+            <a:spLocks noGrp="1"/>
+          </p:cNvSpPr>
+          <p:nvPr>
+            <p:ph type="sldNum" sz="quarter" idx="10"/>
+          </p:nvPr>
+        </p:nvSpPr>
+        <p:spPr/>
+        <p:txBody>
+          <a:bodyPr/>
+          <a:lstStyle/>
+          <a:p>
+            <a:fld id="{B464D382-BCC3-48FB-A706-F28479336870}" type="slidenum">
+              <a:rPr lang="en-US" smtClean="0"/>
+              <a:t>3</a:t>
+            </a:fld>
+            <a:endParaRPr lang="en-US"/>
+          </a:p>
+        </p:txBody>
+      </p:sp>
+    </p:spTree>
+    <p:extLst>
+      <p:ext uri="{BB962C8B-B14F-4D97-AF65-F5344CB8AC3E}">
+        <p14:creationId xmlns:p14="http://schemas.microsoft.com/office/powerpoint/2010/main" val="3572384472"/>
+      </p:ext>
+    </p:extLst>
+  </p:cSld>
+  <p:clrMapOvr>
+    <a:masterClrMapping/>
+  </p:clrMapOvr>
+</p:notes>
+</file>
+
+<file path=ppt/notesSlides/notesSlide4.xml><?xml version="1.0" encoding="utf-8"?>
+<p:notes xmlns:a="http://schemas.openxmlformats.org/drawingml/2006/main" xmlns:r="http://schemas.openxmlformats.org/officeDocument/2006/relationships" xmlns:p="http://schemas.openxmlformats.org/presentationml/2006/main">
+  <p:cSld>
+    <p:spTree>
+      <p:nvGrpSpPr>
+        <p:cNvPr id="1" name=""/>
+        <p:cNvGrpSpPr/>
+        <p:nvPr/>
+      </p:nvGrpSpPr>
+      <p:grpSpPr>
+        <a:xfrm>
+          <a:off x="0" y="0"/>
+          <a:ext cx="0" cy="0"/>
+          <a:chOff x="0" y="0"/>
+          <a:chExt cx="0" cy="0"/>
+        </a:xfrm>
+      </p:grpSpPr>
+      <p:sp>
+        <p:nvSpPr>
+          <p:cNvPr id="2" name="Slide Image Placeholder 1"/>
+          <p:cNvSpPr>
+            <a:spLocks noGrp="1" noRot="1" noChangeAspect="1"/>
+          </p:cNvSpPr>
+          <p:nvPr>
+            <p:ph type="sldImg"/>
+          </p:nvPr>
+        </p:nvSpPr>
+        <p:spPr/>
+      </p:sp>
+      <p:sp>
+        <p:nvSpPr>
+          <p:cNvPr id="3" name="Notes Placeholder 2"/>
+          <p:cNvSpPr>
+            <a:spLocks noGrp="1"/>
+          </p:cNvSpPr>
+          <p:nvPr>
+            <p:ph type="body" idx="1"/>
+          </p:nvPr>
+        </p:nvSpPr>
+        <p:spPr/>
+        <p:txBody>
+          <a:bodyPr/>
+          <a:lstStyle/>
+          <a:p>
+            <a:pPr marL="0" indent="0">
+              <a:buNone/>
+            </a:pPr>
+            <a:r>
+              <a:rPr lang="en-US" dirty="0" smtClean="0"/>
+              <a:t>Duration</a:t>
+            </a:r>
+            <a:r>
+              <a:rPr lang="en-US" baseline="0" dirty="0" smtClean="0"/>
+              <a:t> of warm- up time as a function of when warm-up starts.</a:t>
+            </a:r>
+          </a:p>
+          <a:p>
+            <a:pPr marL="0" indent="0">
+              <a:buNone/>
+            </a:pPr>
+            <a:r>
+              <a:rPr lang="en-US" baseline="0" dirty="0" smtClean="0"/>
+              <a:t>In a) and b) thickest, thick, thin, and dashed denotes body size z = 10, 1, 0.1, 0.01</a:t>
+            </a:r>
+          </a:p>
+          <a:p>
+            <a:pPr marL="0" indent="0">
+              <a:buNone/>
+            </a:pPr>
+            <a:r>
+              <a:rPr lang="en-US" baseline="0" dirty="0" smtClean="0"/>
+              <a:t>In c) Thick, thin, and dashed denote high, medium, and low conductance between the rest-of-the-body and the thorax.</a:t>
+            </a:r>
+          </a:p>
+          <a:p>
+            <a:pPr marL="0" indent="0">
+              <a:buNone/>
+            </a:pPr>
+            <a:r>
+              <a:rPr lang="en-US" baseline="0" dirty="0" smtClean="0"/>
+              <a:t>Other parameters: temperature at sunrise = 15 and peaks at 30 at the middle of the afternoon.</a:t>
+            </a:r>
+          </a:p>
+          <a:p>
+            <a:pPr marL="0" indent="0">
+              <a:buNone/>
+            </a:pPr>
+            <a:r>
+              <a:rPr lang="en-US" baseline="0" dirty="0" smtClean="0"/>
+              <a:t>aw = 1.25 for the endotherm, rK2 = 0.1 all the time. </a:t>
+            </a:r>
+          </a:p>
+          <a:p>
+            <a:pPr marL="0" indent="0">
+              <a:buNone/>
+            </a:pPr>
+            <a:r>
+              <a:rPr lang="en-US" baseline="0" dirty="0" smtClean="0"/>
+              <a:t>Latitude  =30, day = 72.</a:t>
+            </a:r>
+            <a:endParaRPr lang="en-US" dirty="0"/>
+          </a:p>
+        </p:txBody>
+      </p:sp>
+      <p:sp>
+        <p:nvSpPr>
+          <p:cNvPr id="4" name="Slide Number Placeholder 3"/>
+          <p:cNvSpPr>
+            <a:spLocks noGrp="1"/>
+          </p:cNvSpPr>
+          <p:nvPr>
+            <p:ph type="sldNum" sz="quarter" idx="10"/>
+          </p:nvPr>
+        </p:nvSpPr>
+        <p:spPr/>
+        <p:txBody>
+          <a:bodyPr/>
+          <a:lstStyle/>
+          <a:p>
+            <a:fld id="{B464D382-BCC3-48FB-A706-F28479336870}" type="slidenum">
+              <a:rPr lang="en-US" smtClean="0"/>
+              <a:t>4</a:t>
+            </a:fld>
+            <a:endParaRPr lang="en-US"/>
+          </a:p>
+        </p:txBody>
+      </p:sp>
+    </p:spTree>
+    <p:extLst>
+      <p:ext uri="{BB962C8B-B14F-4D97-AF65-F5344CB8AC3E}">
+        <p14:creationId xmlns:p14="http://schemas.microsoft.com/office/powerpoint/2010/main" val="1487846971"/>
+      </p:ext>
+    </p:extLst>
+  </p:cSld>
+  <p:clrMapOvr>
+    <a:masterClrMapping/>
+  </p:clrMapOvr>
+</p:notes>
+</file>
+
+<file path=ppt/notesSlides/notesSlide5.xml><?xml version="1.0" encoding="utf-8"?>
+<p:notes xmlns:a="http://schemas.openxmlformats.org/drawingml/2006/main" xmlns:r="http://schemas.openxmlformats.org/officeDocument/2006/relationships" xmlns:p="http://schemas.openxmlformats.org/presentationml/2006/main">
+  <p:cSld>
+    <p:spTree>
+      <p:nvGrpSpPr>
+        <p:cNvPr id="1" name=""/>
+        <p:cNvGrpSpPr/>
+        <p:nvPr/>
+      </p:nvGrpSpPr>
+      <p:grpSpPr>
+        <a:xfrm>
+          <a:off x="0" y="0"/>
+          <a:ext cx="0" cy="0"/>
+          <a:chOff x="0" y="0"/>
+          <a:chExt cx="0" cy="0"/>
+        </a:xfrm>
+      </p:grpSpPr>
+      <p:sp>
+        <p:nvSpPr>
+          <p:cNvPr id="2" name="Slide Image Placeholder 1"/>
+          <p:cNvSpPr>
+            <a:spLocks noGrp="1" noRot="1" noChangeAspect="1"/>
+          </p:cNvSpPr>
+          <p:nvPr>
+            <p:ph type="sldImg"/>
+          </p:nvPr>
+        </p:nvSpPr>
+        <p:spPr/>
+      </p:sp>
+      <p:sp>
+        <p:nvSpPr>
+          <p:cNvPr id="3" name="Notes Placeholder 2"/>
+          <p:cNvSpPr>
+            <a:spLocks noGrp="1"/>
+          </p:cNvSpPr>
+          <p:nvPr>
+            <p:ph type="body" idx="1"/>
+          </p:nvPr>
+        </p:nvSpPr>
+        <p:spPr/>
+        <p:txBody>
+          <a:bodyPr/>
+          <a:lstStyle/>
+          <a:p>
+            <a:r>
+              <a:rPr lang="en-US" dirty="0" smtClean="0"/>
+              <a:t>Niche</a:t>
+            </a:r>
+            <a:r>
+              <a:rPr lang="en-US" baseline="0" dirty="0" smtClean="0"/>
+              <a:t> shape as a function of temperature during one day.</a:t>
+            </a:r>
+          </a:p>
+          <a:p>
+            <a:pPr marL="228600" indent="-228600">
+              <a:buAutoNum type="alphaLcParenR"/>
+            </a:pPr>
+            <a:r>
+              <a:rPr lang="en-US" baseline="0" dirty="0" smtClean="0"/>
+              <a:t>No warm-up, high resource availability (30 gram), and constant temperature</a:t>
+            </a:r>
+          </a:p>
+          <a:p>
+            <a:pPr marL="228600" indent="-228600">
+              <a:buAutoNum type="alphaLcParenR"/>
+            </a:pPr>
+            <a:r>
+              <a:rPr lang="en-US" baseline="0" dirty="0" smtClean="0"/>
+              <a:t>Resource availability is cut in half, no warm-up and constant temperature</a:t>
+            </a:r>
+          </a:p>
+          <a:p>
+            <a:pPr marL="228600" indent="-228600">
+              <a:buAutoNum type="alphaLcParenR"/>
+            </a:pPr>
+            <a:r>
+              <a:rPr lang="en-US" baseline="0" dirty="0" smtClean="0"/>
+              <a:t>Warm-up is added but resource availability is restored to high</a:t>
+            </a:r>
+          </a:p>
+          <a:p>
+            <a:pPr marL="228600" indent="-228600">
+              <a:buAutoNum type="alphaLcParenR"/>
+            </a:pPr>
+            <a:r>
+              <a:rPr lang="en-US" baseline="0" dirty="0" smtClean="0"/>
+              <a:t>Warm-up is added and temperature increases by 15 during the day which peaks at </a:t>
+            </a:r>
+            <a:r>
+              <a:rPr lang="en-US" baseline="0" smtClean="0"/>
+              <a:t>30 in mid </a:t>
+            </a:r>
+            <a:r>
+              <a:rPr lang="en-US" baseline="0" dirty="0" smtClean="0"/>
+              <a:t>afternoon.</a:t>
+            </a:r>
+          </a:p>
+          <a:p>
+            <a:pPr marL="0" indent="0">
+              <a:buNone/>
+            </a:pPr>
+            <a:r>
+              <a:rPr lang="en-US" baseline="0" dirty="0" smtClean="0"/>
+              <a:t>Other parameters: b3 = 1, b2 = b1  = 0.75, metabolic scope = 20, aw = 1.25.</a:t>
+            </a:r>
+            <a:endParaRPr lang="en-US" dirty="0"/>
+          </a:p>
+        </p:txBody>
+      </p:sp>
+      <p:sp>
+        <p:nvSpPr>
+          <p:cNvPr id="4" name="Slide Number Placeholder 3"/>
+          <p:cNvSpPr>
+            <a:spLocks noGrp="1"/>
+          </p:cNvSpPr>
+          <p:nvPr>
+            <p:ph type="sldNum" sz="quarter" idx="10"/>
+          </p:nvPr>
+        </p:nvSpPr>
+        <p:spPr/>
+        <p:txBody>
+          <a:bodyPr/>
+          <a:lstStyle/>
+          <a:p>
+            <a:fld id="{B464D382-BCC3-48FB-A706-F28479336870}" type="slidenum">
+              <a:rPr lang="en-US" smtClean="0"/>
+              <a:t>5</a:t>
+            </a:fld>
+            <a:endParaRPr lang="en-US"/>
+          </a:p>
+        </p:txBody>
+      </p:sp>
+    </p:spTree>
+    <p:extLst>
+      <p:ext uri="{BB962C8B-B14F-4D97-AF65-F5344CB8AC3E}">
+        <p14:creationId xmlns:p14="http://schemas.microsoft.com/office/powerpoint/2010/main" val="559547864"/>
       </p:ext>
     </p:extLst>
   </p:cSld>
@@ -779,7 +1266,7 @@
           <a:p>
             <a:fld id="{BE59CCFF-7F30-4EBF-8C9D-A17B7370DFFF}" type="datetimeFigureOut">
               <a:rPr lang="en-US" smtClean="0"/>
-              <a:t>28/12/2015</a:t>
+              <a:t>17/02/2016</a:t>
             </a:fld>
             <a:endParaRPr lang="en-US"/>
           </a:p>
@@ -949,7 +1436,7 @@
           <a:p>
             <a:fld id="{BE59CCFF-7F30-4EBF-8C9D-A17B7370DFFF}" type="datetimeFigureOut">
               <a:rPr lang="en-US" smtClean="0"/>
-              <a:t>28/12/2015</a:t>
+              <a:t>17/02/2016</a:t>
             </a:fld>
             <a:endParaRPr lang="en-US"/>
           </a:p>
@@ -1129,7 +1616,7 @@
           <a:p>
             <a:fld id="{BE59CCFF-7F30-4EBF-8C9D-A17B7370DFFF}" type="datetimeFigureOut">
               <a:rPr lang="en-US" smtClean="0"/>
-              <a:t>28/12/2015</a:t>
+              <a:t>17/02/2016</a:t>
             </a:fld>
             <a:endParaRPr lang="en-US"/>
           </a:p>
@@ -1299,7 +1786,7 @@
           <a:p>
             <a:fld id="{BE59CCFF-7F30-4EBF-8C9D-A17B7370DFFF}" type="datetimeFigureOut">
               <a:rPr lang="en-US" smtClean="0"/>
-              <a:t>28/12/2015</a:t>
+              <a:t>17/02/2016</a:t>
             </a:fld>
             <a:endParaRPr lang="en-US"/>
           </a:p>
@@ -1545,7 +2032,7 @@
           <a:p>
             <a:fld id="{BE59CCFF-7F30-4EBF-8C9D-A17B7370DFFF}" type="datetimeFigureOut">
               <a:rPr lang="en-US" smtClean="0"/>
-              <a:t>28/12/2015</a:t>
+              <a:t>17/02/2016</a:t>
             </a:fld>
             <a:endParaRPr lang="en-US"/>
           </a:p>
@@ -1777,7 +2264,7 @@
           <a:p>
             <a:fld id="{BE59CCFF-7F30-4EBF-8C9D-A17B7370DFFF}" type="datetimeFigureOut">
               <a:rPr lang="en-US" smtClean="0"/>
-              <a:t>28/12/2015</a:t>
+              <a:t>17/02/2016</a:t>
             </a:fld>
             <a:endParaRPr lang="en-US"/>
           </a:p>
@@ -2144,7 +2631,7 @@
           <a:p>
             <a:fld id="{BE59CCFF-7F30-4EBF-8C9D-A17B7370DFFF}" type="datetimeFigureOut">
               <a:rPr lang="en-US" smtClean="0"/>
-              <a:t>28/12/2015</a:t>
+              <a:t>17/02/2016</a:t>
             </a:fld>
             <a:endParaRPr lang="en-US"/>
           </a:p>
@@ -2262,7 +2749,7 @@
           <a:p>
             <a:fld id="{BE59CCFF-7F30-4EBF-8C9D-A17B7370DFFF}" type="datetimeFigureOut">
               <a:rPr lang="en-US" smtClean="0"/>
-              <a:t>28/12/2015</a:t>
+              <a:t>17/02/2016</a:t>
             </a:fld>
             <a:endParaRPr lang="en-US"/>
           </a:p>
@@ -2357,7 +2844,7 @@
           <a:p>
             <a:fld id="{BE59CCFF-7F30-4EBF-8C9D-A17B7370DFFF}" type="datetimeFigureOut">
               <a:rPr lang="en-US" smtClean="0"/>
-              <a:t>28/12/2015</a:t>
+              <a:t>17/02/2016</a:t>
             </a:fld>
             <a:endParaRPr lang="en-US"/>
           </a:p>
@@ -2634,7 +3121,7 @@
           <a:p>
             <a:fld id="{BE59CCFF-7F30-4EBF-8C9D-A17B7370DFFF}" type="datetimeFigureOut">
               <a:rPr lang="en-US" smtClean="0"/>
-              <a:t>28/12/2015</a:t>
+              <a:t>17/02/2016</a:t>
             </a:fld>
             <a:endParaRPr lang="en-US"/>
           </a:p>
@@ -2887,7 +3374,7 @@
           <a:p>
             <a:fld id="{BE59CCFF-7F30-4EBF-8C9D-A17B7370DFFF}" type="datetimeFigureOut">
               <a:rPr lang="en-US" smtClean="0"/>
-              <a:t>28/12/2015</a:t>
+              <a:t>17/02/2016</a:t>
             </a:fld>
             <a:endParaRPr lang="en-US"/>
           </a:p>
@@ -3100,7 +3587,7 @@
           <a:p>
             <a:fld id="{BE59CCFF-7F30-4EBF-8C9D-A17B7370DFFF}" type="datetimeFigureOut">
               <a:rPr lang="en-US" smtClean="0"/>
-              <a:t>28/12/2015</a:t>
+              <a:t>17/02/2016</a:t>
             </a:fld>
             <a:endParaRPr lang="en-US"/>
           </a:p>
@@ -3527,8 +4014,8 @@
         </p:blipFill>
         <p:spPr>
           <a:xfrm>
-            <a:off x="1146753" y="1034432"/>
-            <a:ext cx="3592286" cy="2414016"/>
+            <a:off x="1425223" y="2039537"/>
+            <a:ext cx="9171432" cy="2523744"/>
           </a:xfrm>
           <a:prstGeom prst="rect">
             <a:avLst/>
@@ -3542,9 +4029,9 @@
           <p:nvPr/>
         </p:nvSpPr>
         <p:spPr>
-          <a:xfrm rot="16200000">
-            <a:off x="-1066801" y="3350268"/>
-            <a:ext cx="3584636" cy="338554"/>
+          <a:xfrm>
+            <a:off x="4306711" y="4298210"/>
+            <a:ext cx="2632452" cy="461665"/>
           </a:xfrm>
           <a:prstGeom prst="rect">
             <a:avLst/>
@@ -3558,13 +4045,13 @@
           <a:lstStyle/>
           <a:p>
             <a:r>
-              <a:rPr lang="en-US" sz="1600" dirty="0" smtClean="0">
+              <a:rPr lang="en-US" sz="2400" dirty="0" smtClean="0">
                 <a:latin typeface="Arial" panose="020B0604020202020204" pitchFamily="34" charset="0"/>
                 <a:cs typeface="Arial" panose="020B0604020202020204" pitchFamily="34" charset="0"/>
               </a:rPr>
-              <a:t>Minimum environmental temperature </a:t>
-            </a:r>
-            <a:endParaRPr lang="en-US" sz="1600" dirty="0">
+              <a:t>Body size in gram</a:t>
+            </a:r>
+            <a:endParaRPr lang="en-US" sz="2400" dirty="0">
               <a:latin typeface="Arial" panose="020B0604020202020204" pitchFamily="34" charset="0"/>
               <a:cs typeface="Arial" panose="020B0604020202020204" pitchFamily="34" charset="0"/>
             </a:endParaRPr>
@@ -3578,9 +4065,9 @@
           <p:nvPr/>
         </p:nvSpPr>
         <p:spPr>
-          <a:xfrm>
-            <a:off x="2440199" y="618386"/>
-            <a:ext cx="1141659" cy="338554"/>
+          <a:xfrm rot="16200000">
+            <a:off x="701349" y="2861542"/>
+            <a:ext cx="1332416" cy="461665"/>
           </a:xfrm>
           <a:prstGeom prst="rect">
             <a:avLst/>
@@ -3594,13 +4081,13 @@
           <a:lstStyle/>
           <a:p>
             <a:r>
-              <a:rPr lang="en-US" sz="1600" dirty="0" smtClean="0">
+              <a:rPr lang="en-US" sz="2400" dirty="0" smtClean="0">
                 <a:latin typeface="Arial" panose="020B0604020202020204" pitchFamily="34" charset="0"/>
                 <a:cs typeface="Arial" panose="020B0604020202020204" pitchFamily="34" charset="0"/>
               </a:rPr>
-              <a:t>Default K1</a:t>
-            </a:r>
-            <a:endParaRPr lang="en-US" sz="1600" dirty="0">
+              <a:t>Net gain</a:t>
+            </a:r>
+            <a:endParaRPr lang="en-US" sz="2400" dirty="0">
               <a:latin typeface="Arial" panose="020B0604020202020204" pitchFamily="34" charset="0"/>
               <a:cs typeface="Arial" panose="020B0604020202020204" pitchFamily="34" charset="0"/>
             </a:endParaRPr>
@@ -3615,8 +4102,8 @@
         </p:nvSpPr>
         <p:spPr>
           <a:xfrm>
-            <a:off x="4928716" y="6498263"/>
-            <a:ext cx="1814920" cy="338554"/>
+            <a:off x="1955734" y="1843533"/>
+            <a:ext cx="458780" cy="461665"/>
           </a:xfrm>
           <a:prstGeom prst="rect">
             <a:avLst/>
@@ -3630,29 +4117,138 @@
           <a:lstStyle/>
           <a:p>
             <a:r>
-              <a:rPr lang="en-US" sz="1600" dirty="0" smtClean="0">
+              <a:rPr lang="en-US" sz="2400" dirty="0" smtClean="0">
                 <a:latin typeface="Arial" panose="020B0604020202020204" pitchFamily="34" charset="0"/>
                 <a:cs typeface="Arial" panose="020B0604020202020204" pitchFamily="34" charset="0"/>
               </a:rPr>
-              <a:t>Body size in gram</a:t>
-            </a:r>
-            <a:endParaRPr lang="en-US" sz="1600" dirty="0">
+              <a:t>a)</a:t>
+            </a:r>
+            <a:endParaRPr lang="en-US" sz="2400" dirty="0">
               <a:latin typeface="Arial" panose="020B0604020202020204" pitchFamily="34" charset="0"/>
               <a:cs typeface="Arial" panose="020B0604020202020204" pitchFamily="34" charset="0"/>
             </a:endParaRPr>
           </a:p>
         </p:txBody>
       </p:sp>
+      <p:sp>
+        <p:nvSpPr>
+          <p:cNvPr id="8" name="TextBox 7"/>
+          <p:cNvSpPr txBox="1"/>
+          <p:nvPr/>
+        </p:nvSpPr>
+        <p:spPr>
+          <a:xfrm>
+            <a:off x="5918134" y="1868933"/>
+            <a:ext cx="458780" cy="461665"/>
+          </a:xfrm>
+          <a:prstGeom prst="rect">
+            <a:avLst/>
+          </a:prstGeom>
+          <a:noFill/>
+        </p:spPr>
+        <p:txBody>
+          <a:bodyPr wrap="none" rtlCol="0">
+            <a:spAutoFit/>
+          </a:bodyPr>
+          <a:lstStyle/>
+          <a:p>
+            <a:r>
+              <a:rPr lang="en-US" sz="2400" dirty="0" smtClean="0">
+                <a:latin typeface="Arial" panose="020B0604020202020204" pitchFamily="34" charset="0"/>
+                <a:cs typeface="Arial" panose="020B0604020202020204" pitchFamily="34" charset="0"/>
+              </a:rPr>
+              <a:t>b)</a:t>
+            </a:r>
+            <a:endParaRPr lang="en-US" sz="2400" dirty="0">
+              <a:latin typeface="Arial" panose="020B0604020202020204" pitchFamily="34" charset="0"/>
+              <a:cs typeface="Arial" panose="020B0604020202020204" pitchFamily="34" charset="0"/>
+            </a:endParaRPr>
+          </a:p>
+        </p:txBody>
+      </p:sp>
+      <p:sp>
+        <p:nvSpPr>
+          <p:cNvPr id="9" name="TextBox 8"/>
+          <p:cNvSpPr txBox="1"/>
+          <p:nvPr/>
+        </p:nvSpPr>
+        <p:spPr>
+          <a:xfrm>
+            <a:off x="84267" y="6265446"/>
+            <a:ext cx="1314784" cy="461665"/>
+          </a:xfrm>
+          <a:prstGeom prst="rect">
+            <a:avLst/>
+          </a:prstGeom>
+          <a:noFill/>
+        </p:spPr>
+        <p:txBody>
+          <a:bodyPr wrap="none" rtlCol="0">
+            <a:spAutoFit/>
+          </a:bodyPr>
+          <a:lstStyle/>
+          <a:p>
+            <a:r>
+              <a:rPr lang="en-US" sz="2400" smtClean="0">
+                <a:latin typeface="Arial" panose="020B0604020202020204" pitchFamily="34" charset="0"/>
+                <a:cs typeface="Arial" panose="020B0604020202020204" pitchFamily="34" charset="0"/>
+              </a:rPr>
+              <a:t>Figure </a:t>
+            </a:r>
+            <a:r>
+              <a:rPr lang="en-US" sz="2400" dirty="0">
+                <a:latin typeface="Arial" panose="020B0604020202020204" pitchFamily="34" charset="0"/>
+                <a:cs typeface="Arial" panose="020B0604020202020204" pitchFamily="34" charset="0"/>
+              </a:rPr>
+              <a:t>1</a:t>
+            </a:r>
+            <a:endParaRPr lang="en-US" sz="2400" dirty="0">
+              <a:latin typeface="Arial" panose="020B0604020202020204" pitchFamily="34" charset="0"/>
+              <a:cs typeface="Arial" panose="020B0604020202020204" pitchFamily="34" charset="0"/>
+            </a:endParaRPr>
+          </a:p>
+        </p:txBody>
+      </p:sp>
+    </p:spTree>
+    <p:extLst>
+      <p:ext uri="{BB962C8B-B14F-4D97-AF65-F5344CB8AC3E}">
+        <p14:creationId xmlns:p14="http://schemas.microsoft.com/office/powerpoint/2010/main" val="402576337"/>
+      </p:ext>
+    </p:extLst>
+  </p:cSld>
+  <p:clrMapOvr>
+    <a:masterClrMapping/>
+  </p:clrMapOvr>
+</p:sld>
+</file>
+
+<file path=ppt/slides/slide2.xml><?xml version="1.0" encoding="utf-8"?>
+<p:sld xmlns:a="http://schemas.openxmlformats.org/drawingml/2006/main" xmlns:r="http://schemas.openxmlformats.org/officeDocument/2006/relationships" xmlns:p="http://schemas.openxmlformats.org/presentationml/2006/main">
+  <p:cSld>
+    <p:spTree>
+      <p:nvGrpSpPr>
+        <p:cNvPr id="1" name=""/>
+        <p:cNvGrpSpPr/>
+        <p:nvPr/>
+      </p:nvGrpSpPr>
+      <p:grpSpPr>
+        <a:xfrm>
+          <a:off x="0" y="0"/>
+          <a:ext cx="0" cy="0"/>
+          <a:chOff x="0" y="0"/>
+          <a:chExt cx="0" cy="0"/>
+        </a:xfrm>
+      </p:grpSpPr>
       <p:pic>
         <p:nvPicPr>
-          <p:cNvPr id="8" name="Picture 7"/>
+          <p:cNvPr id="4" name="Picture 3"/>
           <p:cNvPicPr>
             <a:picLocks noChangeAspect="1"/>
           </p:cNvPicPr>
           <p:nvPr/>
         </p:nvPicPr>
         <p:blipFill>
-          <a:blip r:embed="rId4">
+          <a:blip r:embed="rId3">
             <a:extLst>
               <a:ext uri="{28A0092B-C50C-407E-A947-70E740481C1C}">
                 <a14:useLocalDpi xmlns:a14="http://schemas.microsoft.com/office/drawing/2010/main" val="0"/>
@@ -3665,24 +4261,212 @@
         </p:blipFill>
         <p:spPr>
           <a:xfrm>
-            <a:off x="6121245" y="1034432"/>
-            <a:ext cx="3592285" cy="2414016"/>
+            <a:off x="1652016" y="2080260"/>
+            <a:ext cx="8887968" cy="2697480"/>
           </a:xfrm>
           <a:prstGeom prst="rect">
             <a:avLst/>
           </a:prstGeom>
         </p:spPr>
       </p:pic>
-      <p:sp>
-        <p:nvSpPr>
-          <p:cNvPr id="9" name="TextBox 8"/>
+      <mc:AlternateContent xmlns:mc="http://schemas.openxmlformats.org/markup-compatibility/2006" xmlns:a14="http://schemas.microsoft.com/office/drawing/2010/main">
+        <mc:Choice Requires="a14">
+          <p:sp>
+            <p:nvSpPr>
+              <p:cNvPr id="7" name="TextBox 6"/>
+              <p:cNvSpPr txBox="1"/>
+              <p:nvPr/>
+            </p:nvSpPr>
+            <p:spPr>
+              <a:xfrm rot="16200000">
+                <a:off x="545409" y="3170259"/>
+                <a:ext cx="1751698" cy="520463"/>
+              </a:xfrm>
+              <a:prstGeom prst="rect">
+                <a:avLst/>
+              </a:prstGeom>
+              <a:noFill/>
+            </p:spPr>
+            <p:txBody>
+              <a:bodyPr wrap="none" lIns="0" tIns="0" rIns="0" bIns="0" rtlCol="0">
+                <a:spAutoFit/>
+              </a:bodyPr>
+              <a:lstStyle/>
+              <a:p>
+                <a:pPr/>
+                <a14:m>
+                  <m:oMathPara xmlns:m="http://schemas.openxmlformats.org/officeDocument/2006/math">
+                    <m:oMathParaPr>
+                      <m:jc m:val="centerGroup"/>
+                    </m:oMathParaPr>
+                    <m:oMath xmlns:m="http://schemas.openxmlformats.org/officeDocument/2006/math">
+                      <m:acc>
+                        <m:accPr>
+                          <m:chr m:val="̃"/>
+                          <m:ctrlPr>
+                            <a:rPr lang="en-US" sz="3200" b="0" i="1" smtClean="0">
+                              <a:latin typeface="Cambria Math" panose="02040503050406030204" pitchFamily="18" charset="0"/>
+                              <a:ea typeface="Cambria Math" panose="02040503050406030204" pitchFamily="18" charset="0"/>
+                            </a:rPr>
+                          </m:ctrlPr>
+                        </m:accPr>
+                        <m:e>
+                          <m:r>
+                            <a:rPr lang="en-US" sz="3200" i="1">
+                              <a:latin typeface="Cambria Math" panose="02040503050406030204" pitchFamily="18" charset="0"/>
+                              <a:ea typeface="Cambria Math" panose="02040503050406030204" pitchFamily="18" charset="0"/>
+                            </a:rPr>
+                            <m:t>𝑑</m:t>
+                          </m:r>
+                          <m:sSub>
+                            <m:sSubPr>
+                              <m:ctrlPr>
+                                <a:rPr lang="en-US" sz="3200" i="1">
+                                  <a:latin typeface="Cambria Math" panose="02040503050406030204" pitchFamily="18" charset="0"/>
+                                  <a:ea typeface="Cambria Math" panose="02040503050406030204" pitchFamily="18" charset="0"/>
+                                </a:rPr>
+                              </m:ctrlPr>
+                            </m:sSubPr>
+                            <m:e>
+                              <m:r>
+                                <a:rPr lang="en-US" sz="3200" i="1">
+                                  <a:latin typeface="Cambria Math" panose="02040503050406030204" pitchFamily="18" charset="0"/>
+                                  <a:ea typeface="Cambria Math" panose="02040503050406030204" pitchFamily="18" charset="0"/>
+                                </a:rPr>
+                                <m:t>𝐸</m:t>
+                              </m:r>
+                            </m:e>
+                            <m:sub>
+                              <m:r>
+                                <a:rPr lang="en-US" sz="3200" i="1">
+                                  <a:latin typeface="Cambria Math" panose="02040503050406030204" pitchFamily="18" charset="0"/>
+                                  <a:ea typeface="Cambria Math" panose="02040503050406030204" pitchFamily="18" charset="0"/>
+                                </a:rPr>
+                                <m:t>𝑛</m:t>
+                              </m:r>
+                            </m:sub>
+                          </m:sSub>
+                        </m:e>
+                      </m:acc>
+                      <m:r>
+                        <a:rPr lang="en-US" sz="3200" b="0" i="1" smtClean="0">
+                          <a:latin typeface="Cambria Math" panose="02040503050406030204" pitchFamily="18" charset="0"/>
+                          <a:ea typeface="Cambria Math" panose="02040503050406030204" pitchFamily="18" charset="0"/>
+                        </a:rPr>
+                        <m:t>,</m:t>
+                      </m:r>
+                      <m:acc>
+                        <m:accPr>
+                          <m:chr m:val="̃"/>
+                          <m:ctrlPr>
+                            <a:rPr lang="en-US" sz="3200" b="0" i="1" smtClean="0">
+                              <a:latin typeface="Cambria Math" panose="02040503050406030204" pitchFamily="18" charset="0"/>
+                              <a:ea typeface="Cambria Math" panose="02040503050406030204" pitchFamily="18" charset="0"/>
+                            </a:rPr>
+                          </m:ctrlPr>
+                        </m:accPr>
+                        <m:e>
+                          <m:sSub>
+                            <m:sSubPr>
+                              <m:ctrlPr>
+                                <a:rPr lang="en-US" sz="3200" b="0" i="1" smtClean="0">
+                                  <a:latin typeface="Cambria Math" panose="02040503050406030204" pitchFamily="18" charset="0"/>
+                                  <a:ea typeface="Cambria Math" panose="02040503050406030204" pitchFamily="18" charset="0"/>
+                                </a:rPr>
+                              </m:ctrlPr>
+                            </m:sSubPr>
+                            <m:e>
+                              <m:r>
+                                <a:rPr lang="en-US" sz="3200" b="0" i="1" smtClean="0">
+                                  <a:latin typeface="Cambria Math" panose="02040503050406030204" pitchFamily="18" charset="0"/>
+                                  <a:ea typeface="Cambria Math" panose="02040503050406030204" pitchFamily="18" charset="0"/>
+                                </a:rPr>
+                                <m:t>𝐸</m:t>
+                              </m:r>
+                            </m:e>
+                            <m:sub>
+                              <m:r>
+                                <a:rPr lang="en-US" sz="3200" b="0" i="1" smtClean="0">
+                                  <a:latin typeface="Cambria Math" panose="02040503050406030204" pitchFamily="18" charset="0"/>
+                                  <a:ea typeface="Cambria Math" panose="02040503050406030204" pitchFamily="18" charset="0"/>
+                                </a:rPr>
+                                <m:t>𝑛</m:t>
+                              </m:r>
+                            </m:sub>
+                          </m:sSub>
+                        </m:e>
+                      </m:acc>
+                      <m:r>
+                        <a:rPr lang="en-US" sz="3200" b="0" i="1" smtClean="0">
+                          <a:latin typeface="Cambria Math" panose="02040503050406030204" pitchFamily="18" charset="0"/>
+                          <a:ea typeface="Cambria Math" panose="02040503050406030204" pitchFamily="18" charset="0"/>
+                        </a:rPr>
+                        <m:t>, </m:t>
+                      </m:r>
+                      <m:r>
+                        <a:rPr lang="en-US" sz="3200" i="1" smtClean="0">
+                          <a:latin typeface="Cambria Math" panose="02040503050406030204" pitchFamily="18" charset="0"/>
+                          <a:ea typeface="Cambria Math" panose="02040503050406030204" pitchFamily="18" charset="0"/>
+                        </a:rPr>
+                        <m:t>𝜀</m:t>
+                      </m:r>
+                    </m:oMath>
+                  </m:oMathPara>
+                </a14:m>
+                <a:endParaRPr lang="en-US" sz="1200" dirty="0"/>
+              </a:p>
+            </p:txBody>
+          </p:sp>
+        </mc:Choice>
+        <mc:Fallback xmlns="">
+          <p:sp>
+            <p:nvSpPr>
+              <p:cNvPr id="7" name="TextBox 6"/>
+              <p:cNvSpPr txBox="1">
+                <a:spLocks noRot="1" noChangeAspect="1" noMove="1" noResize="1" noEditPoints="1" noAdjustHandles="1" noChangeArrowheads="1" noChangeShapeType="1" noTextEdit="1"/>
+              </p:cNvSpPr>
+              <p:nvPr/>
+            </p:nvSpPr>
+            <p:spPr>
+              <a:xfrm rot="16200000">
+                <a:off x="545409" y="3170259"/>
+                <a:ext cx="1751698" cy="520463"/>
+              </a:xfrm>
+              <a:prstGeom prst="rect">
+                <a:avLst/>
+              </a:prstGeom>
+              <a:blipFill rotWithShape="0">
+                <a:blip r:embed="rId4"/>
+                <a:stretch>
+                  <a:fillRect/>
+                </a:stretch>
+              </a:blipFill>
+            </p:spPr>
+            <p:txBody>
+              <a:bodyPr/>
+              <a:lstStyle/>
+              <a:p>
+                <a:r>
+                  <a:rPr lang="en-US">
+                    <a:noFill/>
+                  </a:rPr>
+                  <a:t> </a:t>
+                </a:r>
+              </a:p>
+            </p:txBody>
+          </p:sp>
+        </mc:Fallback>
+      </mc:AlternateContent>
+      <p:sp>
+        <p:nvSpPr>
+          <p:cNvPr id="8" name="TextBox 7"/>
           <p:cNvSpPr txBox="1"/>
           <p:nvPr/>
         </p:nvSpPr>
         <p:spPr>
           <a:xfrm>
-            <a:off x="6824839" y="582803"/>
-            <a:ext cx="2393604" cy="338554"/>
+            <a:off x="2689382" y="4628885"/>
+            <a:ext cx="2632452" cy="461665"/>
           </a:xfrm>
           <a:prstGeom prst="rect">
             <a:avLst/>
@@ -3696,29 +4480,319 @@
           <a:lstStyle/>
           <a:p>
             <a:r>
-              <a:rPr lang="en-US" sz="1600" dirty="0" smtClean="0">
+              <a:rPr lang="en-US" sz="2400" dirty="0" smtClean="0">
                 <a:latin typeface="Arial" panose="020B0604020202020204" pitchFamily="34" charset="0"/>
                 <a:cs typeface="Arial" panose="020B0604020202020204" pitchFamily="34" charset="0"/>
               </a:rPr>
-              <a:t>K1  = 0.1 x default value</a:t>
-            </a:r>
-            <a:endParaRPr lang="en-US" sz="1600" dirty="0">
+              <a:t>Body size in gram</a:t>
+            </a:r>
+            <a:endParaRPr lang="en-US" sz="2400" dirty="0">
               <a:latin typeface="Arial" panose="020B0604020202020204" pitchFamily="34" charset="0"/>
               <a:cs typeface="Arial" panose="020B0604020202020204" pitchFamily="34" charset="0"/>
             </a:endParaRPr>
           </a:p>
         </p:txBody>
       </p:sp>
+      <p:sp>
+        <p:nvSpPr>
+          <p:cNvPr id="9" name="TextBox 8"/>
+          <p:cNvSpPr txBox="1"/>
+          <p:nvPr/>
+        </p:nvSpPr>
+        <p:spPr>
+          <a:xfrm rot="16200000">
+            <a:off x="5537256" y="3005094"/>
+            <a:ext cx="1332416" cy="461665"/>
+          </a:xfrm>
+          <a:prstGeom prst="rect">
+            <a:avLst/>
+          </a:prstGeom>
+          <a:noFill/>
+        </p:spPr>
+        <p:txBody>
+          <a:bodyPr wrap="none" rtlCol="0">
+            <a:spAutoFit/>
+          </a:bodyPr>
+          <a:lstStyle/>
+          <a:p>
+            <a:r>
+              <a:rPr lang="en-US" sz="2400" dirty="0" smtClean="0">
+                <a:latin typeface="Arial" panose="020B0604020202020204" pitchFamily="34" charset="0"/>
+                <a:cs typeface="Arial" panose="020B0604020202020204" pitchFamily="34" charset="0"/>
+              </a:rPr>
+              <a:t>Net gain</a:t>
+            </a:r>
+            <a:endParaRPr lang="en-US" sz="2400" dirty="0">
+              <a:latin typeface="Arial" panose="020B0604020202020204" pitchFamily="34" charset="0"/>
+              <a:cs typeface="Arial" panose="020B0604020202020204" pitchFamily="34" charset="0"/>
+            </a:endParaRPr>
+          </a:p>
+        </p:txBody>
+      </p:sp>
+      <p:sp>
+        <p:nvSpPr>
+          <p:cNvPr id="10" name="TextBox 9"/>
+          <p:cNvSpPr txBox="1"/>
+          <p:nvPr/>
+        </p:nvSpPr>
+        <p:spPr>
+          <a:xfrm>
+            <a:off x="7572680" y="4628884"/>
+            <a:ext cx="2632452" cy="461665"/>
+          </a:xfrm>
+          <a:prstGeom prst="rect">
+            <a:avLst/>
+          </a:prstGeom>
+          <a:noFill/>
+        </p:spPr>
+        <p:txBody>
+          <a:bodyPr wrap="none" rtlCol="0">
+            <a:spAutoFit/>
+          </a:bodyPr>
+          <a:lstStyle/>
+          <a:p>
+            <a:r>
+              <a:rPr lang="en-US" sz="2400" dirty="0" smtClean="0">
+                <a:latin typeface="Arial" panose="020B0604020202020204" pitchFamily="34" charset="0"/>
+                <a:cs typeface="Arial" panose="020B0604020202020204" pitchFamily="34" charset="0"/>
+              </a:rPr>
+              <a:t>Body size in gram</a:t>
+            </a:r>
+            <a:endParaRPr lang="en-US" sz="2400" dirty="0">
+              <a:latin typeface="Arial" panose="020B0604020202020204" pitchFamily="34" charset="0"/>
+              <a:cs typeface="Arial" panose="020B0604020202020204" pitchFamily="34" charset="0"/>
+            </a:endParaRPr>
+          </a:p>
+        </p:txBody>
+      </p:sp>
+      <p:sp>
+        <p:nvSpPr>
+          <p:cNvPr id="11" name="TextBox 10"/>
+          <p:cNvSpPr txBox="1"/>
+          <p:nvPr/>
+        </p:nvSpPr>
+        <p:spPr>
+          <a:xfrm>
+            <a:off x="2082734" y="1843533"/>
+            <a:ext cx="458780" cy="461665"/>
+          </a:xfrm>
+          <a:prstGeom prst="rect">
+            <a:avLst/>
+          </a:prstGeom>
+          <a:noFill/>
+        </p:spPr>
+        <p:txBody>
+          <a:bodyPr wrap="none" rtlCol="0">
+            <a:spAutoFit/>
+          </a:bodyPr>
+          <a:lstStyle/>
+          <a:p>
+            <a:r>
+              <a:rPr lang="en-US" sz="2400" dirty="0" smtClean="0">
+                <a:latin typeface="Arial" panose="020B0604020202020204" pitchFamily="34" charset="0"/>
+                <a:cs typeface="Arial" panose="020B0604020202020204" pitchFamily="34" charset="0"/>
+              </a:rPr>
+              <a:t>a)</a:t>
+            </a:r>
+            <a:endParaRPr lang="en-US" sz="2400" dirty="0">
+              <a:latin typeface="Arial" panose="020B0604020202020204" pitchFamily="34" charset="0"/>
+              <a:cs typeface="Arial" panose="020B0604020202020204" pitchFamily="34" charset="0"/>
+            </a:endParaRPr>
+          </a:p>
+        </p:txBody>
+      </p:sp>
+      <p:sp>
+        <p:nvSpPr>
+          <p:cNvPr id="12" name="TextBox 11"/>
+          <p:cNvSpPr txBox="1"/>
+          <p:nvPr/>
+        </p:nvSpPr>
+        <p:spPr>
+          <a:xfrm>
+            <a:off x="6934134" y="1868933"/>
+            <a:ext cx="458780" cy="461665"/>
+          </a:xfrm>
+          <a:prstGeom prst="rect">
+            <a:avLst/>
+          </a:prstGeom>
+          <a:noFill/>
+        </p:spPr>
+        <p:txBody>
+          <a:bodyPr wrap="none" rtlCol="0">
+            <a:spAutoFit/>
+          </a:bodyPr>
+          <a:lstStyle/>
+          <a:p>
+            <a:r>
+              <a:rPr lang="en-US" sz="2400" dirty="0" smtClean="0">
+                <a:latin typeface="Arial" panose="020B0604020202020204" pitchFamily="34" charset="0"/>
+                <a:cs typeface="Arial" panose="020B0604020202020204" pitchFamily="34" charset="0"/>
+              </a:rPr>
+              <a:t>b)</a:t>
+            </a:r>
+            <a:endParaRPr lang="en-US" sz="2400" dirty="0">
+              <a:latin typeface="Arial" panose="020B0604020202020204" pitchFamily="34" charset="0"/>
+              <a:cs typeface="Arial" panose="020B0604020202020204" pitchFamily="34" charset="0"/>
+            </a:endParaRPr>
+          </a:p>
+        </p:txBody>
+      </p:sp>
+      <p:sp>
+        <p:nvSpPr>
+          <p:cNvPr id="13" name="TextBox 12"/>
+          <p:cNvSpPr txBox="1"/>
+          <p:nvPr/>
+        </p:nvSpPr>
+        <p:spPr>
+          <a:xfrm>
+            <a:off x="84267" y="6265446"/>
+            <a:ext cx="1314784" cy="461665"/>
+          </a:xfrm>
+          <a:prstGeom prst="rect">
+            <a:avLst/>
+          </a:prstGeom>
+          <a:noFill/>
+        </p:spPr>
+        <p:txBody>
+          <a:bodyPr wrap="none" rtlCol="0">
+            <a:spAutoFit/>
+          </a:bodyPr>
+          <a:lstStyle/>
+          <a:p>
+            <a:r>
+              <a:rPr lang="en-US" sz="2400" dirty="0" smtClean="0">
+                <a:latin typeface="Arial" panose="020B0604020202020204" pitchFamily="34" charset="0"/>
+                <a:cs typeface="Arial" panose="020B0604020202020204" pitchFamily="34" charset="0"/>
+              </a:rPr>
+              <a:t>Figure </a:t>
+            </a:r>
+            <a:r>
+              <a:rPr lang="en-US" sz="2400" dirty="0">
+                <a:latin typeface="Arial" panose="020B0604020202020204" pitchFamily="34" charset="0"/>
+                <a:cs typeface="Arial" panose="020B0604020202020204" pitchFamily="34" charset="0"/>
+              </a:rPr>
+              <a:t>2</a:t>
+            </a:r>
+            <a:endParaRPr lang="en-US" sz="2400" dirty="0">
+              <a:latin typeface="Arial" panose="020B0604020202020204" pitchFamily="34" charset="0"/>
+              <a:cs typeface="Arial" panose="020B0604020202020204" pitchFamily="34" charset="0"/>
+            </a:endParaRPr>
+          </a:p>
+        </p:txBody>
+      </p:sp>
+    </p:spTree>
+    <p:extLst>
+      <p:ext uri="{BB962C8B-B14F-4D97-AF65-F5344CB8AC3E}">
+        <p14:creationId xmlns:p14="http://schemas.microsoft.com/office/powerpoint/2010/main" val="3731232279"/>
+      </p:ext>
+    </p:extLst>
+  </p:cSld>
+  <p:clrMapOvr>
+    <a:masterClrMapping/>
+  </p:clrMapOvr>
+</p:sld>
+</file>
+
+<file path=ppt/slides/slide3.xml><?xml version="1.0" encoding="utf-8"?>
+<p:sld xmlns:a="http://schemas.openxmlformats.org/drawingml/2006/main" xmlns:r="http://schemas.openxmlformats.org/officeDocument/2006/relationships" xmlns:p="http://schemas.openxmlformats.org/presentationml/2006/main">
+  <p:cSld>
+    <p:spTree>
+      <p:nvGrpSpPr>
+        <p:cNvPr id="1" name=""/>
+        <p:cNvGrpSpPr/>
+        <p:nvPr/>
+      </p:nvGrpSpPr>
+      <p:grpSpPr>
+        <a:xfrm>
+          <a:off x="0" y="0"/>
+          <a:ext cx="0" cy="0"/>
+          <a:chOff x="0" y="0"/>
+          <a:chExt cx="0" cy="0"/>
+        </a:xfrm>
+      </p:grpSpPr>
+      <p:sp>
+        <p:nvSpPr>
+          <p:cNvPr id="5" name="TextBox 4"/>
+          <p:cNvSpPr txBox="1"/>
+          <p:nvPr/>
+        </p:nvSpPr>
+        <p:spPr>
+          <a:xfrm rot="16200000">
+            <a:off x="-729020" y="3040574"/>
+            <a:ext cx="2991525" cy="461665"/>
+          </a:xfrm>
+          <a:prstGeom prst="rect">
+            <a:avLst/>
+          </a:prstGeom>
+          <a:noFill/>
+        </p:spPr>
+        <p:txBody>
+          <a:bodyPr wrap="none" rtlCol="0">
+            <a:spAutoFit/>
+          </a:bodyPr>
+          <a:lstStyle/>
+          <a:p>
+            <a:pPr algn="ctr"/>
+            <a:r>
+              <a:rPr lang="en-US" sz="2400" dirty="0" smtClean="0">
+                <a:latin typeface="Arial" panose="020B0604020202020204" pitchFamily="34" charset="0"/>
+                <a:cs typeface="Arial" panose="020B0604020202020204" pitchFamily="34" charset="0"/>
+              </a:rPr>
+              <a:t>Lowest temperature </a:t>
+            </a:r>
+            <a:endParaRPr lang="en-US" sz="2400" dirty="0">
+              <a:latin typeface="Arial" panose="020B0604020202020204" pitchFamily="34" charset="0"/>
+              <a:cs typeface="Arial" panose="020B0604020202020204" pitchFamily="34" charset="0"/>
+            </a:endParaRPr>
+          </a:p>
+        </p:txBody>
+      </p:sp>
+      <p:sp>
+        <p:nvSpPr>
+          <p:cNvPr id="7" name="TextBox 6"/>
+          <p:cNvSpPr txBox="1"/>
+          <p:nvPr/>
+        </p:nvSpPr>
+        <p:spPr>
+          <a:xfrm>
+            <a:off x="4665855" y="4330623"/>
+            <a:ext cx="2632452" cy="461665"/>
+          </a:xfrm>
+          <a:prstGeom prst="rect">
+            <a:avLst/>
+          </a:prstGeom>
+          <a:noFill/>
+        </p:spPr>
+        <p:txBody>
+          <a:bodyPr wrap="none" rtlCol="0">
+            <a:spAutoFit/>
+          </a:bodyPr>
+          <a:lstStyle/>
+          <a:p>
+            <a:r>
+              <a:rPr lang="en-US" sz="2400" dirty="0" smtClean="0">
+                <a:latin typeface="Arial" panose="020B0604020202020204" pitchFamily="34" charset="0"/>
+                <a:cs typeface="Arial" panose="020B0604020202020204" pitchFamily="34" charset="0"/>
+              </a:rPr>
+              <a:t>Body size in gram</a:t>
+            </a:r>
+            <a:endParaRPr lang="en-US" sz="2400" dirty="0">
+              <a:latin typeface="Arial" panose="020B0604020202020204" pitchFamily="34" charset="0"/>
+              <a:cs typeface="Arial" panose="020B0604020202020204" pitchFamily="34" charset="0"/>
+            </a:endParaRPr>
+          </a:p>
+        </p:txBody>
+      </p:sp>
       <p:pic>
         <p:nvPicPr>
-          <p:cNvPr id="16" name="Picture 15"/>
+          <p:cNvPr id="2" name="Picture 1"/>
           <p:cNvPicPr>
             <a:picLocks noChangeAspect="1"/>
           </p:cNvPicPr>
           <p:nvPr/>
         </p:nvPicPr>
         <p:blipFill>
-          <a:blip r:embed="rId5">
+          <a:blip r:embed="rId3">
             <a:extLst>
               <a:ext uri="{28A0092B-C50C-407E-A947-70E740481C1C}">
                 <a14:useLocalDpi xmlns:a14="http://schemas.microsoft.com/office/drawing/2010/main" val="0"/>
@@ -3731,54 +4805,24 @@
         </p:blipFill>
         <p:spPr>
           <a:xfrm>
-            <a:off x="1146753" y="3971173"/>
-            <a:ext cx="3592285" cy="2414016"/>
+            <a:off x="1023858" y="2290541"/>
+            <a:ext cx="10635013" cy="2128265"/>
           </a:xfrm>
           <a:prstGeom prst="rect">
             <a:avLst/>
           </a:prstGeom>
         </p:spPr>
       </p:pic>
-      <p:pic>
-        <p:nvPicPr>
-          <p:cNvPr id="18" name="Picture 17"/>
-          <p:cNvPicPr>
-            <a:picLocks noChangeAspect="1"/>
-          </p:cNvPicPr>
-          <p:nvPr/>
-        </p:nvPicPr>
-        <p:blipFill>
-          <a:blip r:embed="rId6">
-            <a:extLst>
-              <a:ext uri="{28A0092B-C50C-407E-A947-70E740481C1C}">
-                <a14:useLocalDpi xmlns:a14="http://schemas.microsoft.com/office/drawing/2010/main" val="0"/>
-              </a:ext>
-            </a:extLst>
-          </a:blip>
-          <a:stretch>
-            <a:fillRect/>
-          </a:stretch>
-        </p:blipFill>
-        <p:spPr>
-          <a:xfrm>
-            <a:off x="6121245" y="3971173"/>
-            <a:ext cx="3592285" cy="2414015"/>
-          </a:xfrm>
-          <a:prstGeom prst="rect">
-            <a:avLst/>
-          </a:prstGeom>
-        </p:spPr>
-      </p:pic>
-      <p:sp>
-        <p:nvSpPr>
-          <p:cNvPr id="27" name="TextBox 26"/>
+      <p:sp>
+        <p:nvSpPr>
+          <p:cNvPr id="19" name="TextBox 18"/>
           <p:cNvSpPr txBox="1"/>
           <p:nvPr/>
         </p:nvSpPr>
         <p:spPr>
-          <a:xfrm rot="16200000">
-            <a:off x="9406268" y="1995646"/>
-            <a:ext cx="1643399" cy="338554"/>
+          <a:xfrm>
+            <a:off x="7814085" y="2011494"/>
+            <a:ext cx="377026" cy="369332"/>
           </a:xfrm>
           <a:prstGeom prst="rect">
             <a:avLst/>
@@ -3792,13 +4836,275 @@
           <a:lstStyle/>
           <a:p>
             <a:r>
-              <a:rPr lang="en-US" sz="1600" dirty="0" smtClean="0">
+              <a:rPr lang="en-US" dirty="0">
+                <a:latin typeface="Arial" panose="020B0604020202020204" pitchFamily="34" charset="0"/>
+                <a:cs typeface="Arial" panose="020B0604020202020204" pitchFamily="34" charset="0"/>
+              </a:rPr>
+              <a:t>c</a:t>
+            </a:r>
+            <a:r>
+              <a:rPr lang="en-US" dirty="0" smtClean="0">
+                <a:latin typeface="Arial" panose="020B0604020202020204" pitchFamily="34" charset="0"/>
+                <a:cs typeface="Arial" panose="020B0604020202020204" pitchFamily="34" charset="0"/>
+              </a:rPr>
+              <a:t>)</a:t>
+            </a:r>
+            <a:endParaRPr lang="en-US" dirty="0">
+              <a:latin typeface="Arial" panose="020B0604020202020204" pitchFamily="34" charset="0"/>
+              <a:cs typeface="Arial" panose="020B0604020202020204" pitchFamily="34" charset="0"/>
+            </a:endParaRPr>
+          </a:p>
+        </p:txBody>
+      </p:sp>
+      <p:sp>
+        <p:nvSpPr>
+          <p:cNvPr id="26" name="TextBox 25"/>
+          <p:cNvSpPr txBox="1"/>
+          <p:nvPr/>
+        </p:nvSpPr>
+        <p:spPr>
+          <a:xfrm>
+            <a:off x="4529404" y="2050311"/>
+            <a:ext cx="389850" cy="369332"/>
+          </a:xfrm>
+          <a:prstGeom prst="rect">
+            <a:avLst/>
+          </a:prstGeom>
+          <a:noFill/>
+        </p:spPr>
+        <p:txBody>
+          <a:bodyPr wrap="none" rtlCol="0">
+            <a:spAutoFit/>
+          </a:bodyPr>
+          <a:lstStyle/>
+          <a:p>
+            <a:r>
+              <a:rPr lang="en-US" dirty="0" smtClean="0">
+                <a:latin typeface="Arial" panose="020B0604020202020204" pitchFamily="34" charset="0"/>
+                <a:cs typeface="Arial" panose="020B0604020202020204" pitchFamily="34" charset="0"/>
+              </a:rPr>
+              <a:t>b)</a:t>
+            </a:r>
+            <a:endParaRPr lang="en-US" dirty="0">
+              <a:latin typeface="Arial" panose="020B0604020202020204" pitchFamily="34" charset="0"/>
+              <a:cs typeface="Arial" panose="020B0604020202020204" pitchFamily="34" charset="0"/>
+            </a:endParaRPr>
+          </a:p>
+        </p:txBody>
+      </p:sp>
+      <p:sp>
+        <p:nvSpPr>
+          <p:cNvPr id="34" name="TextBox 33"/>
+          <p:cNvSpPr txBox="1"/>
+          <p:nvPr/>
+        </p:nvSpPr>
+        <p:spPr>
+          <a:xfrm>
+            <a:off x="1354404" y="2050311"/>
+            <a:ext cx="389850" cy="369332"/>
+          </a:xfrm>
+          <a:prstGeom prst="rect">
+            <a:avLst/>
+          </a:prstGeom>
+          <a:noFill/>
+        </p:spPr>
+        <p:txBody>
+          <a:bodyPr wrap="none" rtlCol="0">
+            <a:spAutoFit/>
+          </a:bodyPr>
+          <a:lstStyle/>
+          <a:p>
+            <a:r>
+              <a:rPr lang="en-US" dirty="0" smtClean="0">
+                <a:latin typeface="Arial" panose="020B0604020202020204" pitchFamily="34" charset="0"/>
+                <a:cs typeface="Arial" panose="020B0604020202020204" pitchFamily="34" charset="0"/>
+              </a:rPr>
+              <a:t>a)</a:t>
+            </a:r>
+            <a:endParaRPr lang="en-US" dirty="0">
+              <a:latin typeface="Arial" panose="020B0604020202020204" pitchFamily="34" charset="0"/>
+              <a:cs typeface="Arial" panose="020B0604020202020204" pitchFamily="34" charset="0"/>
+            </a:endParaRPr>
+          </a:p>
+        </p:txBody>
+      </p:sp>
+      <p:sp>
+        <p:nvSpPr>
+          <p:cNvPr id="35" name="TextBox 34"/>
+          <p:cNvSpPr txBox="1"/>
+          <p:nvPr/>
+        </p:nvSpPr>
+        <p:spPr>
+          <a:xfrm>
+            <a:off x="10557474" y="2546643"/>
+            <a:ext cx="1402948" cy="369332"/>
+          </a:xfrm>
+          <a:prstGeom prst="rect">
+            <a:avLst/>
+          </a:prstGeom>
+          <a:noFill/>
+        </p:spPr>
+        <p:txBody>
+          <a:bodyPr wrap="none" rtlCol="0">
+            <a:spAutoFit/>
+          </a:bodyPr>
+          <a:lstStyle/>
+          <a:p>
+            <a:r>
+              <a:rPr lang="en-US" dirty="0" smtClean="0">
+                <a:latin typeface="Arial" panose="020B0604020202020204" pitchFamily="34" charset="0"/>
+                <a:cs typeface="Arial" panose="020B0604020202020204" pitchFamily="34" charset="0"/>
+              </a:rPr>
+              <a:t>Convection:</a:t>
+            </a:r>
+            <a:endParaRPr lang="en-US" dirty="0">
+              <a:latin typeface="Arial" panose="020B0604020202020204" pitchFamily="34" charset="0"/>
+              <a:cs typeface="Arial" panose="020B0604020202020204" pitchFamily="34" charset="0"/>
+            </a:endParaRPr>
+          </a:p>
+        </p:txBody>
+      </p:sp>
+      <p:sp>
+        <p:nvSpPr>
+          <p:cNvPr id="36" name="TextBox 35"/>
+          <p:cNvSpPr txBox="1"/>
+          <p:nvPr/>
+        </p:nvSpPr>
+        <p:spPr>
+          <a:xfrm>
+            <a:off x="84267" y="6265446"/>
+            <a:ext cx="1314784" cy="461665"/>
+          </a:xfrm>
+          <a:prstGeom prst="rect">
+            <a:avLst/>
+          </a:prstGeom>
+          <a:noFill/>
+        </p:spPr>
+        <p:txBody>
+          <a:bodyPr wrap="none" rtlCol="0">
+            <a:spAutoFit/>
+          </a:bodyPr>
+          <a:lstStyle/>
+          <a:p>
+            <a:r>
+              <a:rPr lang="en-US" sz="2400" dirty="0" smtClean="0">
+                <a:latin typeface="Arial" panose="020B0604020202020204" pitchFamily="34" charset="0"/>
+                <a:cs typeface="Arial" panose="020B0604020202020204" pitchFamily="34" charset="0"/>
+              </a:rPr>
+              <a:t>Figure </a:t>
+            </a:r>
+            <a:r>
+              <a:rPr lang="en-US" sz="2400" dirty="0">
+                <a:latin typeface="Arial" panose="020B0604020202020204" pitchFamily="34" charset="0"/>
+                <a:cs typeface="Arial" panose="020B0604020202020204" pitchFamily="34" charset="0"/>
+              </a:rPr>
+              <a:t>3</a:t>
+            </a:r>
+          </a:p>
+        </p:txBody>
+      </p:sp>
+      <p:sp>
+        <p:nvSpPr>
+          <p:cNvPr id="10" name="TextBox 9"/>
+          <p:cNvSpPr txBox="1"/>
+          <p:nvPr/>
+        </p:nvSpPr>
+        <p:spPr>
+          <a:xfrm>
+            <a:off x="2104540" y="1463978"/>
+            <a:ext cx="1236236" cy="369332"/>
+          </a:xfrm>
+          <a:prstGeom prst="rect">
+            <a:avLst/>
+          </a:prstGeom>
+          <a:noFill/>
+        </p:spPr>
+        <p:txBody>
+          <a:bodyPr wrap="none" rtlCol="0">
+            <a:spAutoFit/>
+          </a:bodyPr>
+          <a:lstStyle/>
+          <a:p>
+            <a:r>
+              <a:rPr lang="en-US" dirty="0" smtClean="0">
+                <a:latin typeface="Arial" panose="020B0604020202020204" pitchFamily="34" charset="0"/>
+                <a:cs typeface="Arial" panose="020B0604020202020204" pitchFamily="34" charset="0"/>
+              </a:rPr>
+              <a:t>Ectotherm</a:t>
+            </a:r>
+            <a:endParaRPr lang="en-US" dirty="0">
+              <a:latin typeface="Arial" panose="020B0604020202020204" pitchFamily="34" charset="0"/>
+              <a:cs typeface="Arial" panose="020B0604020202020204" pitchFamily="34" charset="0"/>
+            </a:endParaRPr>
+          </a:p>
+        </p:txBody>
+      </p:sp>
+      <p:sp>
+        <p:nvSpPr>
+          <p:cNvPr id="12" name="TextBox 11"/>
+          <p:cNvSpPr txBox="1"/>
+          <p:nvPr/>
+        </p:nvSpPr>
+        <p:spPr>
+          <a:xfrm>
+            <a:off x="8458218" y="1506850"/>
+            <a:ext cx="1313180" cy="369332"/>
+          </a:xfrm>
+          <a:prstGeom prst="rect">
+            <a:avLst/>
+          </a:prstGeom>
+          <a:noFill/>
+        </p:spPr>
+        <p:txBody>
+          <a:bodyPr wrap="none" rtlCol="0">
+            <a:spAutoFit/>
+          </a:bodyPr>
+          <a:lstStyle/>
+          <a:p>
+            <a:r>
+              <a:rPr lang="en-US" dirty="0" smtClean="0">
+                <a:latin typeface="Arial" panose="020B0604020202020204" pitchFamily="34" charset="0"/>
+                <a:cs typeface="Arial" panose="020B0604020202020204" pitchFamily="34" charset="0"/>
+              </a:rPr>
+              <a:t>Endotherm</a:t>
+            </a:r>
+            <a:endParaRPr lang="en-US" dirty="0">
+              <a:latin typeface="Arial" panose="020B0604020202020204" pitchFamily="34" charset="0"/>
+              <a:cs typeface="Arial" panose="020B0604020202020204" pitchFamily="34" charset="0"/>
+            </a:endParaRPr>
+          </a:p>
+        </p:txBody>
+      </p:sp>
+      <p:sp>
+        <p:nvSpPr>
+          <p:cNvPr id="13" name="TextBox 12"/>
+          <p:cNvSpPr txBox="1"/>
+          <p:nvPr/>
+        </p:nvSpPr>
+        <p:spPr>
+          <a:xfrm>
+            <a:off x="1863543" y="1755392"/>
+            <a:ext cx="1826141" cy="369332"/>
+          </a:xfrm>
+          <a:prstGeom prst="rect">
+            <a:avLst/>
+          </a:prstGeom>
+          <a:noFill/>
+        </p:spPr>
+        <p:txBody>
+          <a:bodyPr wrap="none" rtlCol="0">
+            <a:spAutoFit/>
+          </a:bodyPr>
+          <a:lstStyle/>
+          <a:p>
+            <a:r>
+              <a:rPr lang="en-US" dirty="0" smtClean="0">
                 <a:latin typeface="Arial" panose="020B0604020202020204" pitchFamily="34" charset="0"/>
                 <a:cs typeface="Arial" panose="020B0604020202020204" pitchFamily="34" charset="0"/>
               </a:rPr>
               <a:t>Free convection</a:t>
             </a:r>
-            <a:endParaRPr lang="en-US" sz="1600" dirty="0">
+            <a:endParaRPr lang="en-US" dirty="0">
               <a:latin typeface="Arial" panose="020B0604020202020204" pitchFamily="34" charset="0"/>
               <a:cs typeface="Arial" panose="020B0604020202020204" pitchFamily="34" charset="0"/>
             </a:endParaRPr>
@@ -3807,14 +5113,14 @@
       </p:sp>
       <p:sp>
         <p:nvSpPr>
-          <p:cNvPr id="28" name="TextBox 27"/>
+          <p:cNvPr id="14" name="TextBox 13"/>
           <p:cNvSpPr txBox="1"/>
           <p:nvPr/>
         </p:nvSpPr>
         <p:spPr>
-          <a:xfrm rot="16200000">
-            <a:off x="9246770" y="4879827"/>
-            <a:ext cx="1962397" cy="338554"/>
+          <a:xfrm>
+            <a:off x="4923649" y="1755392"/>
+            <a:ext cx="2185214" cy="369332"/>
           </a:xfrm>
           <a:prstGeom prst="rect">
             <a:avLst/>
@@ -3828,13 +5134,13 @@
           <a:lstStyle/>
           <a:p>
             <a:r>
-              <a:rPr lang="en-US" sz="1600" dirty="0" smtClean="0">
+              <a:rPr lang="en-US" dirty="0" smtClean="0">
                 <a:latin typeface="Arial" panose="020B0604020202020204" pitchFamily="34" charset="0"/>
                 <a:cs typeface="Arial" panose="020B0604020202020204" pitchFamily="34" charset="0"/>
               </a:rPr>
               <a:t>Laminar convection</a:t>
             </a:r>
-            <a:endParaRPr lang="en-US" sz="1600" dirty="0">
+            <a:endParaRPr lang="en-US" dirty="0">
               <a:latin typeface="Arial" panose="020B0604020202020204" pitchFamily="34" charset="0"/>
               <a:cs typeface="Arial" panose="020B0604020202020204" pitchFamily="34" charset="0"/>
             </a:endParaRPr>
@@ -3843,14 +5149,14 @@
       </p:sp>
       <p:sp>
         <p:nvSpPr>
-          <p:cNvPr id="29" name="TextBox 28"/>
+          <p:cNvPr id="15" name="TextBox 14"/>
           <p:cNvSpPr txBox="1"/>
           <p:nvPr/>
         </p:nvSpPr>
         <p:spPr>
           <a:xfrm>
-            <a:off x="84267" y="6519446"/>
-            <a:ext cx="936475" cy="338554"/>
+            <a:off x="8201930" y="1755392"/>
+            <a:ext cx="1826141" cy="369332"/>
           </a:xfrm>
           <a:prstGeom prst="rect">
             <a:avLst/>
@@ -3864,13 +5170,13 @@
           <a:lstStyle/>
           <a:p>
             <a:r>
-              <a:rPr lang="en-US" sz="1600" dirty="0" smtClean="0">
+              <a:rPr lang="en-US" dirty="0" smtClean="0">
                 <a:latin typeface="Arial" panose="020B0604020202020204" pitchFamily="34" charset="0"/>
                 <a:cs typeface="Arial" panose="020B0604020202020204" pitchFamily="34" charset="0"/>
               </a:rPr>
-              <a:t>Figure 3</a:t>
-            </a:r>
-            <a:endParaRPr lang="en-US" sz="1600" dirty="0">
+              <a:t>Free convection</a:t>
+            </a:r>
+            <a:endParaRPr lang="en-US" dirty="0">
               <a:latin typeface="Arial" panose="020B0604020202020204" pitchFamily="34" charset="0"/>
               <a:cs typeface="Arial" panose="020B0604020202020204" pitchFamily="34" charset="0"/>
             </a:endParaRPr>
@@ -3879,14 +5185,14 @@
       </p:sp>
       <p:sp>
         <p:nvSpPr>
-          <p:cNvPr id="30" name="TextBox 29"/>
+          <p:cNvPr id="16" name="TextBox 15"/>
           <p:cNvSpPr txBox="1"/>
           <p:nvPr/>
         </p:nvSpPr>
         <p:spPr>
           <a:xfrm>
-            <a:off x="1458041" y="849273"/>
-            <a:ext cx="458780" cy="461665"/>
+            <a:off x="5304940" y="1489378"/>
+            <a:ext cx="1236236" cy="369332"/>
           </a:xfrm>
           <a:prstGeom prst="rect">
             <a:avLst/>
@@ -3900,121 +5206,13 @@
           <a:lstStyle/>
           <a:p>
             <a:r>
-              <a:rPr lang="en-US" sz="2400" dirty="0" smtClean="0">
+              <a:rPr lang="en-US" dirty="0" smtClean="0">
                 <a:latin typeface="Arial" panose="020B0604020202020204" pitchFamily="34" charset="0"/>
                 <a:cs typeface="Arial" panose="020B0604020202020204" pitchFamily="34" charset="0"/>
               </a:rPr>
-              <a:t>a)</a:t>
-            </a:r>
-            <a:endParaRPr lang="en-US" sz="2400" dirty="0">
-              <a:latin typeface="Arial" panose="020B0604020202020204" pitchFamily="34" charset="0"/>
-              <a:cs typeface="Arial" panose="020B0604020202020204" pitchFamily="34" charset="0"/>
-            </a:endParaRPr>
-          </a:p>
-        </p:txBody>
-      </p:sp>
-      <p:sp>
-        <p:nvSpPr>
-          <p:cNvPr id="31" name="TextBox 30"/>
-          <p:cNvSpPr txBox="1"/>
-          <p:nvPr/>
-        </p:nvSpPr>
-        <p:spPr>
-          <a:xfrm>
-            <a:off x="6479679" y="849273"/>
-            <a:ext cx="458780" cy="461665"/>
-          </a:xfrm>
-          <a:prstGeom prst="rect">
-            <a:avLst/>
-          </a:prstGeom>
-          <a:noFill/>
-        </p:spPr>
-        <p:txBody>
-          <a:bodyPr wrap="none" rtlCol="0">
-            <a:spAutoFit/>
-          </a:bodyPr>
-          <a:lstStyle/>
-          <a:p>
-            <a:r>
-              <a:rPr lang="en-US" sz="2400" dirty="0" smtClean="0">
-                <a:latin typeface="Arial" panose="020B0604020202020204" pitchFamily="34" charset="0"/>
-                <a:cs typeface="Arial" panose="020B0604020202020204" pitchFamily="34" charset="0"/>
-              </a:rPr>
-              <a:t>b)</a:t>
-            </a:r>
-            <a:endParaRPr lang="en-US" sz="2400" dirty="0">
-              <a:latin typeface="Arial" panose="020B0604020202020204" pitchFamily="34" charset="0"/>
-              <a:cs typeface="Arial" panose="020B0604020202020204" pitchFamily="34" charset="0"/>
-            </a:endParaRPr>
-          </a:p>
-        </p:txBody>
-      </p:sp>
-      <p:sp>
-        <p:nvSpPr>
-          <p:cNvPr id="32" name="TextBox 31"/>
-          <p:cNvSpPr txBox="1"/>
-          <p:nvPr/>
-        </p:nvSpPr>
-        <p:spPr>
-          <a:xfrm>
-            <a:off x="1344421" y="3606240"/>
-            <a:ext cx="441146" cy="461665"/>
-          </a:xfrm>
-          <a:prstGeom prst="rect">
-            <a:avLst/>
-          </a:prstGeom>
-          <a:noFill/>
-        </p:spPr>
-        <p:txBody>
-          <a:bodyPr wrap="none" rtlCol="0">
-            <a:spAutoFit/>
-          </a:bodyPr>
-          <a:lstStyle/>
-          <a:p>
-            <a:r>
-              <a:rPr lang="en-US" sz="2400" dirty="0" smtClean="0">
-                <a:latin typeface="Arial" panose="020B0604020202020204" pitchFamily="34" charset="0"/>
-                <a:cs typeface="Arial" panose="020B0604020202020204" pitchFamily="34" charset="0"/>
-              </a:rPr>
-              <a:t>c)</a:t>
-            </a:r>
-            <a:endParaRPr lang="en-US" sz="2400" dirty="0">
-              <a:latin typeface="Arial" panose="020B0604020202020204" pitchFamily="34" charset="0"/>
-              <a:cs typeface="Arial" panose="020B0604020202020204" pitchFamily="34" charset="0"/>
-            </a:endParaRPr>
-          </a:p>
-        </p:txBody>
-      </p:sp>
-      <p:sp>
-        <p:nvSpPr>
-          <p:cNvPr id="33" name="TextBox 32"/>
-          <p:cNvSpPr txBox="1"/>
-          <p:nvPr/>
-        </p:nvSpPr>
-        <p:spPr>
-          <a:xfrm>
-            <a:off x="6366059" y="3606240"/>
-            <a:ext cx="458780" cy="461665"/>
-          </a:xfrm>
-          <a:prstGeom prst="rect">
-            <a:avLst/>
-          </a:prstGeom>
-          <a:noFill/>
-        </p:spPr>
-        <p:txBody>
-          <a:bodyPr wrap="none" rtlCol="0">
-            <a:spAutoFit/>
-          </a:bodyPr>
-          <a:lstStyle/>
-          <a:p>
-            <a:r>
-              <a:rPr lang="en-US" sz="2400" dirty="0" smtClean="0">
-                <a:latin typeface="Arial" panose="020B0604020202020204" pitchFamily="34" charset="0"/>
-                <a:cs typeface="Arial" panose="020B0604020202020204" pitchFamily="34" charset="0"/>
-              </a:rPr>
-              <a:t>d)</a:t>
-            </a:r>
-            <a:endParaRPr lang="en-US" sz="2400" dirty="0">
+              <a:t>Ectotherm</a:t>
+            </a:r>
+            <a:endParaRPr lang="en-US" dirty="0">
               <a:latin typeface="Arial" panose="020B0604020202020204" pitchFamily="34" charset="0"/>
               <a:cs typeface="Arial" panose="020B0604020202020204" pitchFamily="34" charset="0"/>
             </a:endParaRPr>
@@ -4034,7 +5232,7 @@
 </p:sld>
 </file>
 
-<file path=ppt/slides/slide2.xml><?xml version="1.0" encoding="utf-8"?>
+<file path=ppt/slides/slide4.xml><?xml version="1.0" encoding="utf-8"?>
 <p:sld xmlns:a="http://schemas.openxmlformats.org/drawingml/2006/main" xmlns:r="http://schemas.openxmlformats.org/officeDocument/2006/relationships" xmlns:p="http://schemas.openxmlformats.org/presentationml/2006/main">
   <p:cSld>
     <p:spTree>
@@ -4073,8 +5271,8 @@
         </p:blipFill>
         <p:spPr>
           <a:xfrm>
-            <a:off x="1215292" y="1556746"/>
-            <a:ext cx="4572000" cy="3072384"/>
+            <a:off x="1186786" y="2215008"/>
+            <a:ext cx="9683101" cy="2209612"/>
           </a:xfrm>
           <a:prstGeom prst="rect">
             <a:avLst/>
@@ -4083,14 +5281,14 @@
       </p:pic>
       <p:sp>
         <p:nvSpPr>
-          <p:cNvPr id="3" name="TextBox 2"/>
+          <p:cNvPr id="5" name="TextBox 4"/>
           <p:cNvSpPr txBox="1"/>
           <p:nvPr/>
         </p:nvSpPr>
         <p:spPr>
           <a:xfrm rot="16200000">
-            <a:off x="-272293" y="2923661"/>
-            <a:ext cx="2151936" cy="338554"/>
+            <a:off x="-541680" y="2728909"/>
+            <a:ext cx="2870851" cy="830997"/>
           </a:xfrm>
           <a:prstGeom prst="rect">
             <a:avLst/>
@@ -4103,14 +5301,25 @@
           </a:bodyPr>
           <a:lstStyle/>
           <a:p>
-            <a:r>
-              <a:rPr lang="en-US" sz="1600" dirty="0" smtClean="0">
+            <a:pPr algn="ctr"/>
+            <a:r>
+              <a:rPr lang="en-US" sz="2400" dirty="0" smtClean="0">
                 <a:latin typeface="Arial" panose="020B0604020202020204" pitchFamily="34" charset="0"/>
                 <a:cs typeface="Arial" panose="020B0604020202020204" pitchFamily="34" charset="0"/>
               </a:rPr>
-              <a:t>Warm-up time in hour</a:t>
-            </a:r>
-            <a:endParaRPr lang="en-US" sz="1600" dirty="0">
+              <a:t>Total warm-up time </a:t>
+            </a:r>
+          </a:p>
+          <a:p>
+            <a:pPr algn="ctr"/>
+            <a:r>
+              <a:rPr lang="en-US" sz="2400" dirty="0" smtClean="0">
+                <a:latin typeface="Arial" panose="020B0604020202020204" pitchFamily="34" charset="0"/>
+                <a:cs typeface="Arial" panose="020B0604020202020204" pitchFamily="34" charset="0"/>
+              </a:rPr>
+              <a:t>In hours</a:t>
+            </a:r>
+            <a:endParaRPr lang="en-US" sz="2400" dirty="0">
               <a:latin typeface="Arial" panose="020B0604020202020204" pitchFamily="34" charset="0"/>
               <a:cs typeface="Arial" panose="020B0604020202020204" pitchFamily="34" charset="0"/>
             </a:endParaRPr>
@@ -4119,14 +5328,14 @@
       </p:sp>
       <p:sp>
         <p:nvSpPr>
-          <p:cNvPr id="4" name="TextBox 3"/>
+          <p:cNvPr id="7" name="TextBox 6"/>
           <p:cNvSpPr txBox="1"/>
           <p:nvPr/>
         </p:nvSpPr>
         <p:spPr>
           <a:xfrm>
-            <a:off x="5325309" y="4798407"/>
-            <a:ext cx="1814920" cy="338554"/>
+            <a:off x="4115916" y="4297620"/>
+            <a:ext cx="4502964" cy="461665"/>
           </a:xfrm>
           <a:prstGeom prst="rect">
             <a:avLst/>
@@ -4140,13 +5349,13 @@
           <a:lstStyle/>
           <a:p>
             <a:r>
-              <a:rPr lang="en-US" sz="1600" dirty="0" smtClean="0">
+              <a:rPr lang="en-US" sz="2400" dirty="0" smtClean="0">
                 <a:latin typeface="Arial" panose="020B0604020202020204" pitchFamily="34" charset="0"/>
                 <a:cs typeface="Arial" panose="020B0604020202020204" pitchFamily="34" charset="0"/>
               </a:rPr>
-              <a:t>Body size in gram</a:t>
-            </a:r>
-            <a:endParaRPr lang="en-US" sz="1600" dirty="0">
+              <a:t>Timing of warm-up after sunrise</a:t>
+            </a:r>
+            <a:endParaRPr lang="en-US" sz="2400" dirty="0">
               <a:latin typeface="Arial" panose="020B0604020202020204" pitchFamily="34" charset="0"/>
               <a:cs typeface="Arial" panose="020B0604020202020204" pitchFamily="34" charset="0"/>
             </a:endParaRPr>
@@ -4155,14 +5364,14 @@
       </p:sp>
       <p:sp>
         <p:nvSpPr>
-          <p:cNvPr id="5" name="TextBox 4"/>
+          <p:cNvPr id="29" name="TextBox 28"/>
           <p:cNvSpPr txBox="1"/>
           <p:nvPr/>
         </p:nvSpPr>
         <p:spPr>
           <a:xfrm>
-            <a:off x="2679592" y="1048915"/>
-            <a:ext cx="1643399" cy="338554"/>
+            <a:off x="84267" y="6265446"/>
+            <a:ext cx="1314784" cy="461665"/>
           </a:xfrm>
           <a:prstGeom prst="rect">
             <a:avLst/>
@@ -4176,59 +5385,29 @@
           <a:lstStyle/>
           <a:p>
             <a:r>
-              <a:rPr lang="en-US" sz="1600" dirty="0" smtClean="0">
+              <a:rPr lang="en-US" sz="2400" dirty="0" smtClean="0">
                 <a:latin typeface="Arial" panose="020B0604020202020204" pitchFamily="34" charset="0"/>
                 <a:cs typeface="Arial" panose="020B0604020202020204" pitchFamily="34" charset="0"/>
               </a:rPr>
-              <a:t>Free convection</a:t>
-            </a:r>
-            <a:endParaRPr lang="en-US" sz="1600" dirty="0">
+              <a:t>Figure 4</a:t>
+            </a:r>
+            <a:endParaRPr lang="en-US" sz="2400" dirty="0">
               <a:latin typeface="Arial" panose="020B0604020202020204" pitchFamily="34" charset="0"/>
               <a:cs typeface="Arial" panose="020B0604020202020204" pitchFamily="34" charset="0"/>
             </a:endParaRPr>
           </a:p>
         </p:txBody>
       </p:sp>
-      <p:pic>
-        <p:nvPicPr>
-          <p:cNvPr id="6" name="Picture 5"/>
-          <p:cNvPicPr>
-            <a:picLocks noChangeAspect="1"/>
-          </p:cNvPicPr>
-          <p:nvPr/>
-        </p:nvPicPr>
-        <p:blipFill>
-          <a:blip r:embed="rId4">
-            <a:extLst>
-              <a:ext uri="{28A0092B-C50C-407E-A947-70E740481C1C}">
-                <a14:useLocalDpi xmlns:a14="http://schemas.microsoft.com/office/drawing/2010/main" val="0"/>
-              </a:ext>
-            </a:extLst>
-          </a:blip>
-          <a:stretch>
-            <a:fillRect/>
-          </a:stretch>
-        </p:blipFill>
-        <p:spPr>
-          <a:xfrm>
-            <a:off x="6621939" y="1556746"/>
-            <a:ext cx="4364181" cy="3072384"/>
-          </a:xfrm>
-          <a:prstGeom prst="rect">
-            <a:avLst/>
-          </a:prstGeom>
-        </p:spPr>
-      </p:pic>
-      <p:sp>
-        <p:nvSpPr>
-          <p:cNvPr id="7" name="TextBox 6"/>
+      <p:sp>
+        <p:nvSpPr>
+          <p:cNvPr id="19" name="TextBox 18"/>
           <p:cNvSpPr txBox="1"/>
           <p:nvPr/>
         </p:nvSpPr>
         <p:spPr>
           <a:xfrm>
-            <a:off x="7982330" y="1048915"/>
-            <a:ext cx="1962397" cy="338554"/>
+            <a:off x="7814085" y="1923311"/>
+            <a:ext cx="377026" cy="369332"/>
           </a:xfrm>
           <a:prstGeom prst="rect">
             <a:avLst/>
@@ -4242,13 +5421,20 @@
           <a:lstStyle/>
           <a:p>
             <a:r>
-              <a:rPr lang="en-US" sz="1600" dirty="0" smtClean="0">
+              <a:rPr lang="en-US" dirty="0">
                 <a:latin typeface="Arial" panose="020B0604020202020204" pitchFamily="34" charset="0"/>
                 <a:cs typeface="Arial" panose="020B0604020202020204" pitchFamily="34" charset="0"/>
               </a:rPr>
-              <a:t>Laminar convection</a:t>
-            </a:r>
-            <a:endParaRPr lang="en-US" sz="1600" dirty="0">
+              <a:t>c</a:t>
+            </a:r>
+            <a:r>
+              <a:rPr lang="en-US" dirty="0" smtClean="0">
+                <a:latin typeface="Arial" panose="020B0604020202020204" pitchFamily="34" charset="0"/>
+                <a:cs typeface="Arial" panose="020B0604020202020204" pitchFamily="34" charset="0"/>
+              </a:rPr>
+              <a:t>)</a:t>
+            </a:r>
+            <a:endParaRPr lang="en-US" dirty="0">
               <a:latin typeface="Arial" panose="020B0604020202020204" pitchFamily="34" charset="0"/>
               <a:cs typeface="Arial" panose="020B0604020202020204" pitchFamily="34" charset="0"/>
             </a:endParaRPr>
@@ -4257,14 +5443,14 @@
       </p:sp>
       <p:sp>
         <p:nvSpPr>
-          <p:cNvPr id="8" name="TextBox 7"/>
+          <p:cNvPr id="26" name="TextBox 25"/>
           <p:cNvSpPr txBox="1"/>
           <p:nvPr/>
         </p:nvSpPr>
         <p:spPr>
           <a:xfrm>
-            <a:off x="84267" y="6519446"/>
-            <a:ext cx="936475" cy="338554"/>
+            <a:off x="4783404" y="1923311"/>
+            <a:ext cx="389850" cy="369332"/>
           </a:xfrm>
           <a:prstGeom prst="rect">
             <a:avLst/>
@@ -4278,499 +5464,28 @@
           <a:lstStyle/>
           <a:p>
             <a:r>
-              <a:rPr lang="en-US" sz="1600" dirty="0" smtClean="0">
-                <a:latin typeface="Arial" panose="020B0604020202020204" pitchFamily="34" charset="0"/>
-                <a:cs typeface="Arial" panose="020B0604020202020204" pitchFamily="34" charset="0"/>
-              </a:rPr>
-              <a:t>Figure 4</a:t>
-            </a:r>
-            <a:endParaRPr lang="en-US" sz="1600" dirty="0">
-              <a:latin typeface="Arial" panose="020B0604020202020204" pitchFamily="34" charset="0"/>
-              <a:cs typeface="Arial" panose="020B0604020202020204" pitchFamily="34" charset="0"/>
-            </a:endParaRPr>
-          </a:p>
-        </p:txBody>
-      </p:sp>
-      <p:sp>
-        <p:nvSpPr>
-          <p:cNvPr id="9" name="TextBox 8"/>
-          <p:cNvSpPr txBox="1"/>
-          <p:nvPr/>
-        </p:nvSpPr>
-        <p:spPr>
-          <a:xfrm>
-            <a:off x="1661241" y="1387469"/>
-            <a:ext cx="458780" cy="461665"/>
-          </a:xfrm>
-          <a:prstGeom prst="rect">
-            <a:avLst/>
-          </a:prstGeom>
-          <a:noFill/>
-        </p:spPr>
-        <p:txBody>
-          <a:bodyPr wrap="none" rtlCol="0">
-            <a:spAutoFit/>
-          </a:bodyPr>
-          <a:lstStyle/>
-          <a:p>
-            <a:r>
-              <a:rPr lang="en-US" sz="2400" dirty="0" smtClean="0">
-                <a:latin typeface="Arial" panose="020B0604020202020204" pitchFamily="34" charset="0"/>
-                <a:cs typeface="Arial" panose="020B0604020202020204" pitchFamily="34" charset="0"/>
-              </a:rPr>
-              <a:t>a)</a:t>
-            </a:r>
-            <a:endParaRPr lang="en-US" sz="2400" dirty="0">
-              <a:latin typeface="Arial" panose="020B0604020202020204" pitchFamily="34" charset="0"/>
-              <a:cs typeface="Arial" panose="020B0604020202020204" pitchFamily="34" charset="0"/>
-            </a:endParaRPr>
-          </a:p>
-        </p:txBody>
-      </p:sp>
-      <p:sp>
-        <p:nvSpPr>
-          <p:cNvPr id="10" name="TextBox 9"/>
-          <p:cNvSpPr txBox="1"/>
-          <p:nvPr/>
-        </p:nvSpPr>
-        <p:spPr>
-          <a:xfrm>
-            <a:off x="6901457" y="1387469"/>
-            <a:ext cx="458780" cy="461665"/>
-          </a:xfrm>
-          <a:prstGeom prst="rect">
-            <a:avLst/>
-          </a:prstGeom>
-          <a:noFill/>
-        </p:spPr>
-        <p:txBody>
-          <a:bodyPr wrap="none" rtlCol="0">
-            <a:spAutoFit/>
-          </a:bodyPr>
-          <a:lstStyle/>
-          <a:p>
-            <a:r>
-              <a:rPr lang="en-US" sz="2400" dirty="0" smtClean="0">
+              <a:rPr lang="en-US" dirty="0" smtClean="0">
                 <a:latin typeface="Arial" panose="020B0604020202020204" pitchFamily="34" charset="0"/>
                 <a:cs typeface="Arial" panose="020B0604020202020204" pitchFamily="34" charset="0"/>
               </a:rPr>
               <a:t>b)</a:t>
             </a:r>
-            <a:endParaRPr lang="en-US" sz="2400" dirty="0">
+            <a:endParaRPr lang="en-US" dirty="0">
               <a:latin typeface="Arial" panose="020B0604020202020204" pitchFamily="34" charset="0"/>
               <a:cs typeface="Arial" panose="020B0604020202020204" pitchFamily="34" charset="0"/>
             </a:endParaRPr>
           </a:p>
         </p:txBody>
       </p:sp>
-    </p:spTree>
-    <p:extLst>
-      <p:ext uri="{BB962C8B-B14F-4D97-AF65-F5344CB8AC3E}">
-        <p14:creationId xmlns:p14="http://schemas.microsoft.com/office/powerpoint/2010/main" val="3196797173"/>
-      </p:ext>
-    </p:extLst>
-  </p:cSld>
-  <p:clrMapOvr>
-    <a:masterClrMapping/>
-  </p:clrMapOvr>
-</p:sld>
-</file>
-
-<file path=ppt/slides/slide3.xml><?xml version="1.0" encoding="utf-8"?>
-<p:sld xmlns:a="http://schemas.openxmlformats.org/drawingml/2006/main" xmlns:r="http://schemas.openxmlformats.org/officeDocument/2006/relationships" xmlns:p="http://schemas.openxmlformats.org/presentationml/2006/main">
-  <p:cSld>
-    <p:spTree>
-      <p:nvGrpSpPr>
-        <p:cNvPr id="1" name=""/>
-        <p:cNvGrpSpPr/>
-        <p:nvPr/>
-      </p:nvGrpSpPr>
-      <p:grpSpPr>
-        <a:xfrm>
-          <a:off x="0" y="0"/>
-          <a:ext cx="0" cy="0"/>
-          <a:chOff x="0" y="0"/>
-          <a:chExt cx="0" cy="0"/>
-        </a:xfrm>
-      </p:grpSpPr>
-      <p:pic>
-        <p:nvPicPr>
-          <p:cNvPr id="2" name="Picture 1"/>
-          <p:cNvPicPr>
-            <a:picLocks noChangeAspect="1"/>
-          </p:cNvPicPr>
-          <p:nvPr/>
-        </p:nvPicPr>
-        <p:blipFill>
-          <a:blip r:embed="rId2">
-            <a:extLst>
-              <a:ext uri="{28A0092B-C50C-407E-A947-70E740481C1C}">
-                <a14:useLocalDpi xmlns:a14="http://schemas.microsoft.com/office/drawing/2010/main" val="0"/>
-              </a:ext>
-            </a:extLst>
-          </a:blip>
-          <a:stretch>
-            <a:fillRect/>
-          </a:stretch>
-        </p:blipFill>
-        <p:spPr>
-          <a:xfrm>
-            <a:off x="993064" y="1198489"/>
-            <a:ext cx="10058396" cy="2172831"/>
-          </a:xfrm>
-          <a:prstGeom prst="rect">
-            <a:avLst/>
-          </a:prstGeom>
-        </p:spPr>
-      </p:pic>
-      <p:pic>
-        <p:nvPicPr>
-          <p:cNvPr id="3" name="Picture 2"/>
-          <p:cNvPicPr>
-            <a:picLocks noChangeAspect="1"/>
-          </p:cNvPicPr>
-          <p:nvPr/>
-        </p:nvPicPr>
-        <p:blipFill>
-          <a:blip r:embed="rId3">
-            <a:extLst>
-              <a:ext uri="{28A0092B-C50C-407E-A947-70E740481C1C}">
-                <a14:useLocalDpi xmlns:a14="http://schemas.microsoft.com/office/drawing/2010/main" val="0"/>
-              </a:ext>
-            </a:extLst>
-          </a:blip>
-          <a:stretch>
-            <a:fillRect/>
-          </a:stretch>
-        </p:blipFill>
-        <p:spPr>
-          <a:xfrm>
-            <a:off x="1063402" y="3890895"/>
-            <a:ext cx="10058396" cy="2172831"/>
-          </a:xfrm>
-          <a:prstGeom prst="rect">
-            <a:avLst/>
-          </a:prstGeom>
-        </p:spPr>
-      </p:pic>
-      <p:sp>
-        <p:nvSpPr>
-          <p:cNvPr id="4" name="TextBox 3"/>
+      <p:sp>
+        <p:nvSpPr>
+          <p:cNvPr id="34" name="TextBox 33"/>
           <p:cNvSpPr txBox="1"/>
           <p:nvPr/>
         </p:nvSpPr>
         <p:spPr>
-          <a:xfrm rot="16200000">
-            <a:off x="-90571" y="3350268"/>
-            <a:ext cx="1632178" cy="338554"/>
-          </a:xfrm>
-          <a:prstGeom prst="rect">
-            <a:avLst/>
-          </a:prstGeom>
-          <a:noFill/>
-        </p:spPr>
-        <p:txBody>
-          <a:bodyPr wrap="none" rtlCol="0">
-            <a:spAutoFit/>
-          </a:bodyPr>
-          <a:lstStyle/>
-          <a:p>
-            <a:r>
-              <a:rPr lang="en-US" sz="1600" dirty="0" smtClean="0">
-                <a:latin typeface="Arial" panose="020B0604020202020204" pitchFamily="34" charset="0"/>
-                <a:cs typeface="Arial" panose="020B0604020202020204" pitchFamily="34" charset="0"/>
-              </a:rPr>
-              <a:t>Net energy gain</a:t>
-            </a:r>
-            <a:endParaRPr lang="en-US" sz="1600" dirty="0">
-              <a:latin typeface="Arial" panose="020B0604020202020204" pitchFamily="34" charset="0"/>
-              <a:cs typeface="Arial" panose="020B0604020202020204" pitchFamily="34" charset="0"/>
-            </a:endParaRPr>
-          </a:p>
-        </p:txBody>
-      </p:sp>
-      <p:sp>
-        <p:nvSpPr>
-          <p:cNvPr id="5" name="TextBox 4"/>
-          <p:cNvSpPr txBox="1"/>
-          <p:nvPr/>
-        </p:nvSpPr>
-        <p:spPr>
-          <a:xfrm>
-            <a:off x="4928716" y="5990266"/>
-            <a:ext cx="2659702" cy="338554"/>
-          </a:xfrm>
-          <a:prstGeom prst="rect">
-            <a:avLst/>
-          </a:prstGeom>
-          <a:noFill/>
-        </p:spPr>
-        <p:txBody>
-          <a:bodyPr wrap="none" rtlCol="0">
-            <a:spAutoFit/>
-          </a:bodyPr>
-          <a:lstStyle/>
-          <a:p>
-            <a:r>
-              <a:rPr lang="en-US" sz="1600" dirty="0" smtClean="0">
-                <a:latin typeface="Arial" panose="020B0604020202020204" pitchFamily="34" charset="0"/>
-                <a:cs typeface="Arial" panose="020B0604020202020204" pitchFamily="34" charset="0"/>
-              </a:rPr>
-              <a:t>Environmental temperature</a:t>
-            </a:r>
-            <a:endParaRPr lang="en-US" sz="1600" dirty="0">
-              <a:latin typeface="Arial" panose="020B0604020202020204" pitchFamily="34" charset="0"/>
-              <a:cs typeface="Arial" panose="020B0604020202020204" pitchFamily="34" charset="0"/>
-            </a:endParaRPr>
-          </a:p>
-        </p:txBody>
-      </p:sp>
-      <p:sp>
-        <p:nvSpPr>
-          <p:cNvPr id="6" name="TextBox 5"/>
-          <p:cNvSpPr txBox="1"/>
-          <p:nvPr/>
-        </p:nvSpPr>
-        <p:spPr>
-          <a:xfrm rot="16200000">
-            <a:off x="10894465" y="1850911"/>
-            <a:ext cx="1130438" cy="338554"/>
-          </a:xfrm>
-          <a:prstGeom prst="rect">
-            <a:avLst/>
-          </a:prstGeom>
-          <a:noFill/>
-        </p:spPr>
-        <p:txBody>
-          <a:bodyPr wrap="none" rtlCol="0">
-            <a:spAutoFit/>
-          </a:bodyPr>
-          <a:lstStyle/>
-          <a:p>
-            <a:r>
-              <a:rPr lang="en-US" sz="1600" dirty="0" smtClean="0">
-                <a:latin typeface="Arial" panose="020B0604020202020204" pitchFamily="34" charset="0"/>
-                <a:cs typeface="Arial" panose="020B0604020202020204" pitchFamily="34" charset="0"/>
-              </a:rPr>
-              <a:t>Fixed time</a:t>
-            </a:r>
-            <a:endParaRPr lang="en-US" sz="1600" dirty="0">
-              <a:latin typeface="Arial" panose="020B0604020202020204" pitchFamily="34" charset="0"/>
-              <a:cs typeface="Arial" panose="020B0604020202020204" pitchFamily="34" charset="0"/>
-            </a:endParaRPr>
-          </a:p>
-        </p:txBody>
-      </p:sp>
-      <p:sp>
-        <p:nvSpPr>
-          <p:cNvPr id="7" name="TextBox 6"/>
-          <p:cNvSpPr txBox="1"/>
-          <p:nvPr/>
-        </p:nvSpPr>
-        <p:spPr>
-          <a:xfrm rot="16200000">
-            <a:off x="10689283" y="4735092"/>
-            <a:ext cx="1540806" cy="338554"/>
-          </a:xfrm>
-          <a:prstGeom prst="rect">
-            <a:avLst/>
-          </a:prstGeom>
-          <a:noFill/>
-        </p:spPr>
-        <p:txBody>
-          <a:bodyPr wrap="none" rtlCol="0">
-            <a:spAutoFit/>
-          </a:bodyPr>
-          <a:lstStyle/>
-          <a:p>
-            <a:r>
-              <a:rPr lang="en-US" sz="1600" dirty="0" smtClean="0">
-                <a:latin typeface="Arial" panose="020B0604020202020204" pitchFamily="34" charset="0"/>
-                <a:cs typeface="Arial" panose="020B0604020202020204" pitchFamily="34" charset="0"/>
-              </a:rPr>
-              <a:t>Fixed resource</a:t>
-            </a:r>
-            <a:endParaRPr lang="en-US" sz="1600" dirty="0">
-              <a:latin typeface="Arial" panose="020B0604020202020204" pitchFamily="34" charset="0"/>
-              <a:cs typeface="Arial" panose="020B0604020202020204" pitchFamily="34" charset="0"/>
-            </a:endParaRPr>
-          </a:p>
-        </p:txBody>
-      </p:sp>
-      <p:sp>
-        <p:nvSpPr>
-          <p:cNvPr id="8" name="TextBox 7"/>
-          <p:cNvSpPr txBox="1"/>
-          <p:nvPr/>
-        </p:nvSpPr>
-        <p:spPr>
-          <a:xfrm>
-            <a:off x="2322285" y="859935"/>
-            <a:ext cx="761747" cy="338554"/>
-          </a:xfrm>
-          <a:prstGeom prst="rect">
-            <a:avLst/>
-          </a:prstGeom>
-          <a:noFill/>
-        </p:spPr>
-        <p:txBody>
-          <a:bodyPr wrap="none" rtlCol="0">
-            <a:spAutoFit/>
-          </a:bodyPr>
-          <a:lstStyle/>
-          <a:p>
-            <a:r>
-              <a:rPr lang="en-US" sz="1600" dirty="0">
-                <a:latin typeface="Arial" panose="020B0604020202020204" pitchFamily="34" charset="0"/>
-                <a:cs typeface="Arial" panose="020B0604020202020204" pitchFamily="34" charset="0"/>
-              </a:rPr>
-              <a:t>b</a:t>
-            </a:r>
-            <a:r>
-              <a:rPr lang="en-US" sz="1600" dirty="0" smtClean="0">
-                <a:latin typeface="Arial" panose="020B0604020202020204" pitchFamily="34" charset="0"/>
-                <a:cs typeface="Arial" panose="020B0604020202020204" pitchFamily="34" charset="0"/>
-              </a:rPr>
-              <a:t>3 = 1</a:t>
-            </a:r>
-            <a:endParaRPr lang="en-US" sz="1600" dirty="0">
-              <a:latin typeface="Arial" panose="020B0604020202020204" pitchFamily="34" charset="0"/>
-              <a:cs typeface="Arial" panose="020B0604020202020204" pitchFamily="34" charset="0"/>
-            </a:endParaRPr>
-          </a:p>
-        </p:txBody>
-      </p:sp>
-      <p:sp>
-        <p:nvSpPr>
-          <p:cNvPr id="9" name="TextBox 8"/>
-          <p:cNvSpPr txBox="1"/>
-          <p:nvPr/>
-        </p:nvSpPr>
-        <p:spPr>
-          <a:xfrm>
-            <a:off x="5641388" y="836732"/>
-            <a:ext cx="1047082" cy="338554"/>
-          </a:xfrm>
-          <a:prstGeom prst="rect">
-            <a:avLst/>
-          </a:prstGeom>
-          <a:noFill/>
-        </p:spPr>
-        <p:txBody>
-          <a:bodyPr wrap="none" rtlCol="0">
-            <a:spAutoFit/>
-          </a:bodyPr>
-          <a:lstStyle/>
-          <a:p>
-            <a:r>
-              <a:rPr lang="en-US" sz="1600" dirty="0">
-                <a:latin typeface="Arial" panose="020B0604020202020204" pitchFamily="34" charset="0"/>
-                <a:cs typeface="Arial" panose="020B0604020202020204" pitchFamily="34" charset="0"/>
-              </a:rPr>
-              <a:t>b</a:t>
-            </a:r>
-            <a:r>
-              <a:rPr lang="en-US" sz="1600" dirty="0" smtClean="0">
-                <a:latin typeface="Arial" panose="020B0604020202020204" pitchFamily="34" charset="0"/>
-                <a:cs typeface="Arial" panose="020B0604020202020204" pitchFamily="34" charset="0"/>
-              </a:rPr>
-              <a:t>3 = 0.75</a:t>
-            </a:r>
-            <a:endParaRPr lang="en-US" sz="1600" dirty="0">
-              <a:latin typeface="Arial" panose="020B0604020202020204" pitchFamily="34" charset="0"/>
-              <a:cs typeface="Arial" panose="020B0604020202020204" pitchFamily="34" charset="0"/>
-            </a:endParaRPr>
-          </a:p>
-        </p:txBody>
-      </p:sp>
-      <p:sp>
-        <p:nvSpPr>
-          <p:cNvPr id="10" name="TextBox 9"/>
-          <p:cNvSpPr txBox="1"/>
-          <p:nvPr/>
-        </p:nvSpPr>
-        <p:spPr>
-          <a:xfrm>
-            <a:off x="9068434" y="836732"/>
-            <a:ext cx="933269" cy="338554"/>
-          </a:xfrm>
-          <a:prstGeom prst="rect">
-            <a:avLst/>
-          </a:prstGeom>
-          <a:noFill/>
-        </p:spPr>
-        <p:txBody>
-          <a:bodyPr wrap="none" rtlCol="0">
-            <a:spAutoFit/>
-          </a:bodyPr>
-          <a:lstStyle/>
-          <a:p>
-            <a:r>
-              <a:rPr lang="en-US" sz="1600" dirty="0">
-                <a:latin typeface="Arial" panose="020B0604020202020204" pitchFamily="34" charset="0"/>
-                <a:cs typeface="Arial" panose="020B0604020202020204" pitchFamily="34" charset="0"/>
-              </a:rPr>
-              <a:t>b</a:t>
-            </a:r>
-            <a:r>
-              <a:rPr lang="en-US" sz="1600" dirty="0" smtClean="0">
-                <a:latin typeface="Arial" panose="020B0604020202020204" pitchFamily="34" charset="0"/>
-                <a:cs typeface="Arial" panose="020B0604020202020204" pitchFamily="34" charset="0"/>
-              </a:rPr>
-              <a:t>3 = 0.5</a:t>
-            </a:r>
-            <a:endParaRPr lang="en-US" sz="1600" dirty="0">
-              <a:latin typeface="Arial" panose="020B0604020202020204" pitchFamily="34" charset="0"/>
-              <a:cs typeface="Arial" panose="020B0604020202020204" pitchFamily="34" charset="0"/>
-            </a:endParaRPr>
-          </a:p>
-        </p:txBody>
-      </p:sp>
-      <p:sp>
-        <p:nvSpPr>
-          <p:cNvPr id="11" name="TextBox 10"/>
-          <p:cNvSpPr txBox="1"/>
-          <p:nvPr/>
-        </p:nvSpPr>
-        <p:spPr>
-          <a:xfrm>
-            <a:off x="84267" y="6519446"/>
-            <a:ext cx="936475" cy="338554"/>
-          </a:xfrm>
-          <a:prstGeom prst="rect">
-            <a:avLst/>
-          </a:prstGeom>
-          <a:noFill/>
-        </p:spPr>
-        <p:txBody>
-          <a:bodyPr wrap="none" rtlCol="0">
-            <a:spAutoFit/>
-          </a:bodyPr>
-          <a:lstStyle/>
-          <a:p>
-            <a:r>
-              <a:rPr lang="en-US" sz="1600" dirty="0" smtClean="0">
-                <a:latin typeface="Arial" panose="020B0604020202020204" pitchFamily="34" charset="0"/>
-                <a:cs typeface="Arial" panose="020B0604020202020204" pitchFamily="34" charset="0"/>
-              </a:rPr>
-              <a:t>Figure 5</a:t>
-            </a:r>
-            <a:endParaRPr lang="en-US" sz="1600" dirty="0">
-              <a:latin typeface="Arial" panose="020B0604020202020204" pitchFamily="34" charset="0"/>
-              <a:cs typeface="Arial" panose="020B0604020202020204" pitchFamily="34" charset="0"/>
-            </a:endParaRPr>
-          </a:p>
-        </p:txBody>
-      </p:sp>
-      <p:sp>
-        <p:nvSpPr>
-          <p:cNvPr id="12" name="TextBox 11"/>
-          <p:cNvSpPr txBox="1"/>
-          <p:nvPr/>
-        </p:nvSpPr>
-        <p:spPr>
-          <a:xfrm>
-            <a:off x="1344421" y="903243"/>
+          <a:xfrm>
+            <a:off x="1608404" y="1923311"/>
             <a:ext cx="389850" cy="369332"/>
           </a:xfrm>
           <a:prstGeom prst="rect">
@@ -4800,14 +5515,14 @@
       </p:sp>
       <p:sp>
         <p:nvSpPr>
-          <p:cNvPr id="13" name="TextBox 12"/>
+          <p:cNvPr id="10" name="TextBox 9"/>
           <p:cNvSpPr txBox="1"/>
           <p:nvPr/>
         </p:nvSpPr>
         <p:spPr>
           <a:xfrm>
-            <a:off x="4733791" y="911544"/>
-            <a:ext cx="389850" cy="369332"/>
+            <a:off x="2296936" y="1760850"/>
+            <a:ext cx="1236236" cy="369332"/>
           </a:xfrm>
           <a:prstGeom prst="rect">
             <a:avLst/>
@@ -4825,7 +5540,7 @@
                 <a:latin typeface="Arial" panose="020B0604020202020204" pitchFamily="34" charset="0"/>
                 <a:cs typeface="Arial" panose="020B0604020202020204" pitchFamily="34" charset="0"/>
               </a:rPr>
-              <a:t>b)</a:t>
+              <a:t>Ectotherm</a:t>
             </a:r>
             <a:endParaRPr lang="en-US" dirty="0">
               <a:latin typeface="Arial" panose="020B0604020202020204" pitchFamily="34" charset="0"/>
@@ -4836,14 +5551,14 @@
       </p:sp>
       <p:sp>
         <p:nvSpPr>
-          <p:cNvPr id="14" name="TextBox 13"/>
+          <p:cNvPr id="11" name="TextBox 10"/>
           <p:cNvSpPr txBox="1"/>
           <p:nvPr/>
         </p:nvSpPr>
         <p:spPr>
           <a:xfrm>
-            <a:off x="8245406" y="911544"/>
-            <a:ext cx="377026" cy="369332"/>
+            <a:off x="5410218" y="1760850"/>
+            <a:ext cx="1313180" cy="369332"/>
           </a:xfrm>
           <a:prstGeom prst="rect">
             <a:avLst/>
@@ -4861,7 +5576,7 @@
                 <a:latin typeface="Arial" panose="020B0604020202020204" pitchFamily="34" charset="0"/>
                 <a:cs typeface="Arial" panose="020B0604020202020204" pitchFamily="34" charset="0"/>
               </a:rPr>
-              <a:t>c)</a:t>
+              <a:t>Endotherm</a:t>
             </a:r>
             <a:endParaRPr lang="en-US" dirty="0">
               <a:latin typeface="Arial" panose="020B0604020202020204" pitchFamily="34" charset="0"/>
@@ -4872,14 +5587,14 @@
       </p:sp>
       <p:sp>
         <p:nvSpPr>
-          <p:cNvPr id="15" name="TextBox 14"/>
+          <p:cNvPr id="12" name="TextBox 11"/>
           <p:cNvSpPr txBox="1"/>
           <p:nvPr/>
         </p:nvSpPr>
         <p:spPr>
           <a:xfrm>
-            <a:off x="1344421" y="3621596"/>
-            <a:ext cx="389850" cy="369332"/>
+            <a:off x="8600444" y="1399830"/>
+            <a:ext cx="1556836" cy="923330"/>
           </a:xfrm>
           <a:prstGeom prst="rect">
             <a:avLst/>
@@ -4897,7 +5612,25 @@
                 <a:latin typeface="Arial" panose="020B0604020202020204" pitchFamily="34" charset="0"/>
                 <a:cs typeface="Arial" panose="020B0604020202020204" pitchFamily="34" charset="0"/>
               </a:rPr>
-              <a:t>d)</a:t>
+              <a:t>Endotherm</a:t>
+            </a:r>
+          </a:p>
+          <a:p>
+            <a:r>
+              <a:rPr lang="en-US" dirty="0" smtClean="0">
+                <a:latin typeface="Arial" panose="020B0604020202020204" pitchFamily="34" charset="0"/>
+                <a:cs typeface="Arial" panose="020B0604020202020204" pitchFamily="34" charset="0"/>
+              </a:rPr>
+              <a:t>with different</a:t>
+            </a:r>
+          </a:p>
+          <a:p>
+            <a:r>
+              <a:rPr lang="en-US" dirty="0" smtClean="0">
+                <a:latin typeface="Arial" panose="020B0604020202020204" pitchFamily="34" charset="0"/>
+                <a:cs typeface="Arial" panose="020B0604020202020204" pitchFamily="34" charset="0"/>
+              </a:rPr>
+              <a:t>conductance </a:t>
             </a:r>
             <a:endParaRPr lang="en-US" dirty="0">
               <a:latin typeface="Arial" panose="020B0604020202020204" pitchFamily="34" charset="0"/>
@@ -4906,651 +5639,10 @@
           </a:p>
         </p:txBody>
       </p:sp>
-      <p:sp>
-        <p:nvSpPr>
-          <p:cNvPr id="16" name="TextBox 15"/>
-          <p:cNvSpPr txBox="1"/>
-          <p:nvPr/>
-        </p:nvSpPr>
-        <p:spPr>
-          <a:xfrm>
-            <a:off x="4733791" y="3629897"/>
-            <a:ext cx="389850" cy="369332"/>
-          </a:xfrm>
-          <a:prstGeom prst="rect">
-            <a:avLst/>
-          </a:prstGeom>
-          <a:noFill/>
-        </p:spPr>
-        <p:txBody>
-          <a:bodyPr wrap="none" rtlCol="0">
-            <a:spAutoFit/>
-          </a:bodyPr>
-          <a:lstStyle/>
-          <a:p>
-            <a:r>
-              <a:rPr lang="en-US" dirty="0" smtClean="0">
-                <a:latin typeface="Arial" panose="020B0604020202020204" pitchFamily="34" charset="0"/>
-                <a:cs typeface="Arial" panose="020B0604020202020204" pitchFamily="34" charset="0"/>
-              </a:rPr>
-              <a:t>e)</a:t>
-            </a:r>
-            <a:endParaRPr lang="en-US" dirty="0">
-              <a:latin typeface="Arial" panose="020B0604020202020204" pitchFamily="34" charset="0"/>
-              <a:cs typeface="Arial" panose="020B0604020202020204" pitchFamily="34" charset="0"/>
-            </a:endParaRPr>
-          </a:p>
-        </p:txBody>
-      </p:sp>
-      <p:sp>
-        <p:nvSpPr>
-          <p:cNvPr id="17" name="TextBox 16"/>
-          <p:cNvSpPr txBox="1"/>
-          <p:nvPr/>
-        </p:nvSpPr>
-        <p:spPr>
-          <a:xfrm>
-            <a:off x="8245406" y="3629897"/>
-            <a:ext cx="325730" cy="369332"/>
-          </a:xfrm>
-          <a:prstGeom prst="rect">
-            <a:avLst/>
-          </a:prstGeom>
-          <a:noFill/>
-        </p:spPr>
-        <p:txBody>
-          <a:bodyPr wrap="none" rtlCol="0">
-            <a:spAutoFit/>
-          </a:bodyPr>
-          <a:lstStyle/>
-          <a:p>
-            <a:r>
-              <a:rPr lang="en-US" dirty="0" smtClean="0">
-                <a:latin typeface="Arial" panose="020B0604020202020204" pitchFamily="34" charset="0"/>
-                <a:cs typeface="Arial" panose="020B0604020202020204" pitchFamily="34" charset="0"/>
-              </a:rPr>
-              <a:t>f)</a:t>
-            </a:r>
-            <a:endParaRPr lang="en-US" dirty="0">
-              <a:latin typeface="Arial" panose="020B0604020202020204" pitchFamily="34" charset="0"/>
-              <a:cs typeface="Arial" panose="020B0604020202020204" pitchFamily="34" charset="0"/>
-            </a:endParaRPr>
-          </a:p>
-        </p:txBody>
-      </p:sp>
-      <p:sp>
-        <p:nvSpPr>
-          <p:cNvPr id="21" name="TextBox 20"/>
-          <p:cNvSpPr txBox="1"/>
-          <p:nvPr/>
-        </p:nvSpPr>
-        <p:spPr>
-          <a:xfrm>
-            <a:off x="2322285" y="3497289"/>
-            <a:ext cx="761747" cy="338554"/>
-          </a:xfrm>
-          <a:prstGeom prst="rect">
-            <a:avLst/>
-          </a:prstGeom>
-          <a:noFill/>
-        </p:spPr>
-        <p:txBody>
-          <a:bodyPr wrap="none" rtlCol="0">
-            <a:spAutoFit/>
-          </a:bodyPr>
-          <a:lstStyle/>
-          <a:p>
-            <a:r>
-              <a:rPr lang="en-US" sz="1600" dirty="0">
-                <a:latin typeface="Arial" panose="020B0604020202020204" pitchFamily="34" charset="0"/>
-                <a:cs typeface="Arial" panose="020B0604020202020204" pitchFamily="34" charset="0"/>
-              </a:rPr>
-              <a:t>b</a:t>
-            </a:r>
-            <a:r>
-              <a:rPr lang="en-US" sz="1600" dirty="0" smtClean="0">
-                <a:latin typeface="Arial" panose="020B0604020202020204" pitchFamily="34" charset="0"/>
-                <a:cs typeface="Arial" panose="020B0604020202020204" pitchFamily="34" charset="0"/>
-              </a:rPr>
-              <a:t>3 = 1</a:t>
-            </a:r>
-            <a:endParaRPr lang="en-US" sz="1600" dirty="0">
-              <a:latin typeface="Arial" panose="020B0604020202020204" pitchFamily="34" charset="0"/>
-              <a:cs typeface="Arial" panose="020B0604020202020204" pitchFamily="34" charset="0"/>
-            </a:endParaRPr>
-          </a:p>
-        </p:txBody>
-      </p:sp>
-      <p:sp>
-        <p:nvSpPr>
-          <p:cNvPr id="22" name="TextBox 21"/>
-          <p:cNvSpPr txBox="1"/>
-          <p:nvPr/>
-        </p:nvSpPr>
-        <p:spPr>
-          <a:xfrm>
-            <a:off x="5641388" y="3474086"/>
-            <a:ext cx="1047082" cy="338554"/>
-          </a:xfrm>
-          <a:prstGeom prst="rect">
-            <a:avLst/>
-          </a:prstGeom>
-          <a:noFill/>
-        </p:spPr>
-        <p:txBody>
-          <a:bodyPr wrap="none" rtlCol="0">
-            <a:spAutoFit/>
-          </a:bodyPr>
-          <a:lstStyle/>
-          <a:p>
-            <a:r>
-              <a:rPr lang="en-US" sz="1600" dirty="0">
-                <a:latin typeface="Arial" panose="020B0604020202020204" pitchFamily="34" charset="0"/>
-                <a:cs typeface="Arial" panose="020B0604020202020204" pitchFamily="34" charset="0"/>
-              </a:rPr>
-              <a:t>b</a:t>
-            </a:r>
-            <a:r>
-              <a:rPr lang="en-US" sz="1600" dirty="0" smtClean="0">
-                <a:latin typeface="Arial" panose="020B0604020202020204" pitchFamily="34" charset="0"/>
-                <a:cs typeface="Arial" panose="020B0604020202020204" pitchFamily="34" charset="0"/>
-              </a:rPr>
-              <a:t>3 = 0.75</a:t>
-            </a:r>
-            <a:endParaRPr lang="en-US" sz="1600" dirty="0">
-              <a:latin typeface="Arial" panose="020B0604020202020204" pitchFamily="34" charset="0"/>
-              <a:cs typeface="Arial" panose="020B0604020202020204" pitchFamily="34" charset="0"/>
-            </a:endParaRPr>
-          </a:p>
-        </p:txBody>
-      </p:sp>
-      <p:sp>
-        <p:nvSpPr>
-          <p:cNvPr id="23" name="TextBox 22"/>
-          <p:cNvSpPr txBox="1"/>
-          <p:nvPr/>
-        </p:nvSpPr>
-        <p:spPr>
-          <a:xfrm>
-            <a:off x="9068434" y="3474086"/>
-            <a:ext cx="933269" cy="338554"/>
-          </a:xfrm>
-          <a:prstGeom prst="rect">
-            <a:avLst/>
-          </a:prstGeom>
-          <a:noFill/>
-        </p:spPr>
-        <p:txBody>
-          <a:bodyPr wrap="none" rtlCol="0">
-            <a:spAutoFit/>
-          </a:bodyPr>
-          <a:lstStyle/>
-          <a:p>
-            <a:r>
-              <a:rPr lang="en-US" sz="1600" dirty="0">
-                <a:latin typeface="Arial" panose="020B0604020202020204" pitchFamily="34" charset="0"/>
-                <a:cs typeface="Arial" panose="020B0604020202020204" pitchFamily="34" charset="0"/>
-              </a:rPr>
-              <a:t>b</a:t>
-            </a:r>
-            <a:r>
-              <a:rPr lang="en-US" sz="1600" dirty="0" smtClean="0">
-                <a:latin typeface="Arial" panose="020B0604020202020204" pitchFamily="34" charset="0"/>
-                <a:cs typeface="Arial" panose="020B0604020202020204" pitchFamily="34" charset="0"/>
-              </a:rPr>
-              <a:t>3 = 0.5</a:t>
-            </a:r>
-            <a:endParaRPr lang="en-US" sz="1600" dirty="0">
-              <a:latin typeface="Arial" panose="020B0604020202020204" pitchFamily="34" charset="0"/>
-              <a:cs typeface="Arial" panose="020B0604020202020204" pitchFamily="34" charset="0"/>
-            </a:endParaRPr>
-          </a:p>
-        </p:txBody>
-      </p:sp>
     </p:spTree>
     <p:extLst>
       <p:ext uri="{BB962C8B-B14F-4D97-AF65-F5344CB8AC3E}">
-        <p14:creationId xmlns:p14="http://schemas.microsoft.com/office/powerpoint/2010/main" val="1037112916"/>
-      </p:ext>
-    </p:extLst>
-  </p:cSld>
-  <p:clrMapOvr>
-    <a:masterClrMapping/>
-  </p:clrMapOvr>
-</p:sld>
-</file>
-
-<file path=ppt/slides/slide4.xml><?xml version="1.0" encoding="utf-8"?>
-<p:sld xmlns:a="http://schemas.openxmlformats.org/drawingml/2006/main" xmlns:r="http://schemas.openxmlformats.org/officeDocument/2006/relationships" xmlns:p="http://schemas.openxmlformats.org/presentationml/2006/main">
-  <p:cSld>
-    <p:spTree>
-      <p:nvGrpSpPr>
-        <p:cNvPr id="1" name=""/>
-        <p:cNvGrpSpPr/>
-        <p:nvPr/>
-      </p:nvGrpSpPr>
-      <p:grpSpPr>
-        <a:xfrm>
-          <a:off x="0" y="0"/>
-          <a:ext cx="0" cy="0"/>
-          <a:chOff x="0" y="0"/>
-          <a:chExt cx="0" cy="0"/>
-        </a:xfrm>
-      </p:grpSpPr>
-      <p:pic>
-        <p:nvPicPr>
-          <p:cNvPr id="3" name="Picture 2"/>
-          <p:cNvPicPr>
-            <a:picLocks noChangeAspect="1"/>
-          </p:cNvPicPr>
-          <p:nvPr/>
-        </p:nvPicPr>
-        <p:blipFill>
-          <a:blip r:embed="rId2">
-            <a:extLst>
-              <a:ext uri="{28A0092B-C50C-407E-A947-70E740481C1C}">
-                <a14:useLocalDpi xmlns:a14="http://schemas.microsoft.com/office/drawing/2010/main" val="0"/>
-              </a:ext>
-            </a:extLst>
-          </a:blip>
-          <a:stretch>
-            <a:fillRect/>
-          </a:stretch>
-        </p:blipFill>
-        <p:spPr>
-          <a:xfrm>
-            <a:off x="4546601" y="2026724"/>
-            <a:ext cx="2998030" cy="1828800"/>
-          </a:xfrm>
-          <a:prstGeom prst="rect">
-            <a:avLst/>
-          </a:prstGeom>
-        </p:spPr>
-      </p:pic>
-      <p:pic>
-        <p:nvPicPr>
-          <p:cNvPr id="5" name="Picture 4"/>
-          <p:cNvPicPr>
-            <a:picLocks noChangeAspect="1"/>
-          </p:cNvPicPr>
-          <p:nvPr/>
-        </p:nvPicPr>
-        <p:blipFill>
-          <a:blip r:embed="rId3">
-            <a:extLst>
-              <a:ext uri="{28A0092B-C50C-407E-A947-70E740481C1C}">
-                <a14:useLocalDpi xmlns:a14="http://schemas.microsoft.com/office/drawing/2010/main" val="0"/>
-              </a:ext>
-            </a:extLst>
-          </a:blip>
-          <a:stretch>
-            <a:fillRect/>
-          </a:stretch>
-        </p:blipFill>
-        <p:spPr>
-          <a:xfrm>
-            <a:off x="992555" y="885680"/>
-            <a:ext cx="2998030" cy="1828798"/>
-          </a:xfrm>
-          <a:prstGeom prst="rect">
-            <a:avLst/>
-          </a:prstGeom>
-        </p:spPr>
-      </p:pic>
-      <p:pic>
-        <p:nvPicPr>
-          <p:cNvPr id="6" name="Picture 5"/>
-          <p:cNvPicPr>
-            <a:picLocks noChangeAspect="1"/>
-          </p:cNvPicPr>
-          <p:nvPr/>
-        </p:nvPicPr>
-        <p:blipFill>
-          <a:blip r:embed="rId4">
-            <a:extLst>
-              <a:ext uri="{28A0092B-C50C-407E-A947-70E740481C1C}">
-                <a14:useLocalDpi xmlns:a14="http://schemas.microsoft.com/office/drawing/2010/main" val="0"/>
-              </a:ext>
-            </a:extLst>
-          </a:blip>
-          <a:stretch>
-            <a:fillRect/>
-          </a:stretch>
-        </p:blipFill>
-        <p:spPr>
-          <a:xfrm>
-            <a:off x="8100647" y="885680"/>
-            <a:ext cx="2998030" cy="1828798"/>
-          </a:xfrm>
-          <a:prstGeom prst="rect">
-            <a:avLst/>
-          </a:prstGeom>
-        </p:spPr>
-      </p:pic>
-      <p:pic>
-        <p:nvPicPr>
-          <p:cNvPr id="7" name="Picture 6"/>
-          <p:cNvPicPr>
-            <a:picLocks noChangeAspect="1"/>
-          </p:cNvPicPr>
-          <p:nvPr/>
-        </p:nvPicPr>
-        <p:blipFill>
-          <a:blip r:embed="rId5">
-            <a:extLst>
-              <a:ext uri="{28A0092B-C50C-407E-A947-70E740481C1C}">
-                <a14:useLocalDpi xmlns:a14="http://schemas.microsoft.com/office/drawing/2010/main" val="0"/>
-              </a:ext>
-            </a:extLst>
-          </a:blip>
-          <a:stretch>
-            <a:fillRect/>
-          </a:stretch>
-        </p:blipFill>
-        <p:spPr>
-          <a:xfrm>
-            <a:off x="1007154" y="3507741"/>
-            <a:ext cx="2968831" cy="1828800"/>
-          </a:xfrm>
-          <a:prstGeom prst="rect">
-            <a:avLst/>
-          </a:prstGeom>
-        </p:spPr>
-      </p:pic>
-      <p:pic>
-        <p:nvPicPr>
-          <p:cNvPr id="8" name="Picture 7"/>
-          <p:cNvPicPr>
-            <a:picLocks noChangeAspect="1"/>
-          </p:cNvPicPr>
-          <p:nvPr/>
-        </p:nvPicPr>
-        <p:blipFill>
-          <a:blip r:embed="rId6">
-            <a:extLst>
-              <a:ext uri="{28A0092B-C50C-407E-A947-70E740481C1C}">
-                <a14:useLocalDpi xmlns:a14="http://schemas.microsoft.com/office/drawing/2010/main" val="0"/>
-              </a:ext>
-            </a:extLst>
-          </a:blip>
-          <a:stretch>
-            <a:fillRect/>
-          </a:stretch>
-        </p:blipFill>
-        <p:spPr>
-          <a:xfrm>
-            <a:off x="8100647" y="3507742"/>
-            <a:ext cx="2998030" cy="1828798"/>
-          </a:xfrm>
-          <a:prstGeom prst="rect">
-            <a:avLst/>
-          </a:prstGeom>
-        </p:spPr>
-      </p:pic>
-      <p:sp>
-        <p:nvSpPr>
-          <p:cNvPr id="9" name="TextBox 8"/>
-          <p:cNvSpPr txBox="1"/>
-          <p:nvPr/>
-        </p:nvSpPr>
-        <p:spPr>
-          <a:xfrm>
-            <a:off x="1477289" y="547125"/>
-            <a:ext cx="2379754" cy="338554"/>
-          </a:xfrm>
-          <a:prstGeom prst="rect">
-            <a:avLst/>
-          </a:prstGeom>
-          <a:noFill/>
-        </p:spPr>
-        <p:txBody>
-          <a:bodyPr wrap="none" rtlCol="0">
-            <a:spAutoFit/>
-          </a:bodyPr>
-          <a:lstStyle/>
-          <a:p>
-            <a:r>
-              <a:rPr lang="en-US" sz="1600" dirty="0" err="1" smtClean="0">
-                <a:latin typeface="Arial" panose="020B0604020202020204" pitchFamily="34" charset="0"/>
-                <a:cs typeface="Arial" panose="020B0604020202020204" pitchFamily="34" charset="0"/>
-              </a:rPr>
-              <a:t>Tmax</a:t>
-            </a:r>
-            <a:r>
-              <a:rPr lang="en-US" sz="1600" dirty="0" smtClean="0">
-                <a:latin typeface="Arial" panose="020B0604020202020204" pitchFamily="34" charset="0"/>
-                <a:cs typeface="Arial" panose="020B0604020202020204" pitchFamily="34" charset="0"/>
-              </a:rPr>
-              <a:t> = T sunrise +10 C</a:t>
-            </a:r>
-            <a:endParaRPr lang="en-US" sz="1600" dirty="0">
-              <a:latin typeface="Arial" panose="020B0604020202020204" pitchFamily="34" charset="0"/>
-              <a:cs typeface="Arial" panose="020B0604020202020204" pitchFamily="34" charset="0"/>
-            </a:endParaRPr>
-          </a:p>
-        </p:txBody>
-      </p:sp>
-      <p:sp>
-        <p:nvSpPr>
-          <p:cNvPr id="10" name="TextBox 9"/>
-          <p:cNvSpPr txBox="1"/>
-          <p:nvPr/>
-        </p:nvSpPr>
-        <p:spPr>
-          <a:xfrm>
-            <a:off x="5645506" y="1688170"/>
-            <a:ext cx="800219" cy="338554"/>
-          </a:xfrm>
-          <a:prstGeom prst="rect">
-            <a:avLst/>
-          </a:prstGeom>
-          <a:noFill/>
-        </p:spPr>
-        <p:txBody>
-          <a:bodyPr wrap="none" rtlCol="0">
-            <a:spAutoFit/>
-          </a:bodyPr>
-          <a:lstStyle/>
-          <a:p>
-            <a:r>
-              <a:rPr lang="en-US" sz="1600" dirty="0" smtClean="0">
-                <a:latin typeface="Arial" panose="020B0604020202020204" pitchFamily="34" charset="0"/>
-                <a:cs typeface="Arial" panose="020B0604020202020204" pitchFamily="34" charset="0"/>
-              </a:rPr>
-              <a:t>default</a:t>
-            </a:r>
-            <a:endParaRPr lang="en-US" sz="1600" dirty="0">
-              <a:latin typeface="Arial" panose="020B0604020202020204" pitchFamily="34" charset="0"/>
-              <a:cs typeface="Arial" panose="020B0604020202020204" pitchFamily="34" charset="0"/>
-            </a:endParaRPr>
-          </a:p>
-        </p:txBody>
-      </p:sp>
-      <p:sp>
-        <p:nvSpPr>
-          <p:cNvPr id="11" name="TextBox 10"/>
-          <p:cNvSpPr txBox="1"/>
-          <p:nvPr/>
-        </p:nvSpPr>
-        <p:spPr>
-          <a:xfrm>
-            <a:off x="1724125" y="3169187"/>
-            <a:ext cx="1104790" cy="338554"/>
-          </a:xfrm>
-          <a:prstGeom prst="rect">
-            <a:avLst/>
-          </a:prstGeom>
-          <a:noFill/>
-        </p:spPr>
-        <p:txBody>
-          <a:bodyPr wrap="none" rtlCol="0">
-            <a:spAutoFit/>
-          </a:bodyPr>
-          <a:lstStyle/>
-          <a:p>
-            <a:r>
-              <a:rPr lang="en-US" sz="1600" dirty="0">
-                <a:latin typeface="Arial" panose="020B0604020202020204" pitchFamily="34" charset="0"/>
-                <a:cs typeface="Arial" panose="020B0604020202020204" pitchFamily="34" charset="0"/>
-              </a:rPr>
-              <a:t> </a:t>
-            </a:r>
-            <a:r>
-              <a:rPr lang="en-US" sz="1600" dirty="0" smtClean="0">
-                <a:latin typeface="Arial" panose="020B0604020202020204" pitchFamily="34" charset="0"/>
-                <a:cs typeface="Arial" panose="020B0604020202020204" pitchFamily="34" charset="0"/>
-              </a:rPr>
-              <a:t>b3 = 0.75</a:t>
-            </a:r>
-            <a:endParaRPr lang="en-US" sz="1600" dirty="0">
-              <a:latin typeface="Arial" panose="020B0604020202020204" pitchFamily="34" charset="0"/>
-              <a:cs typeface="Arial" panose="020B0604020202020204" pitchFamily="34" charset="0"/>
-            </a:endParaRPr>
-          </a:p>
-        </p:txBody>
-      </p:sp>
-      <p:sp>
-        <p:nvSpPr>
-          <p:cNvPr id="14" name="TextBox 13"/>
-          <p:cNvSpPr txBox="1"/>
-          <p:nvPr/>
-        </p:nvSpPr>
-        <p:spPr>
-          <a:xfrm>
-            <a:off x="84267" y="6519446"/>
-            <a:ext cx="936475" cy="338554"/>
-          </a:xfrm>
-          <a:prstGeom prst="rect">
-            <a:avLst/>
-          </a:prstGeom>
-          <a:noFill/>
-        </p:spPr>
-        <p:txBody>
-          <a:bodyPr wrap="none" rtlCol="0">
-            <a:spAutoFit/>
-          </a:bodyPr>
-          <a:lstStyle/>
-          <a:p>
-            <a:r>
-              <a:rPr lang="en-US" sz="1600" dirty="0" smtClean="0">
-                <a:latin typeface="Arial" panose="020B0604020202020204" pitchFamily="34" charset="0"/>
-                <a:cs typeface="Arial" panose="020B0604020202020204" pitchFamily="34" charset="0"/>
-              </a:rPr>
-              <a:t>Figure 6</a:t>
-            </a:r>
-            <a:endParaRPr lang="en-US" sz="1600" dirty="0">
-              <a:latin typeface="Arial" panose="020B0604020202020204" pitchFamily="34" charset="0"/>
-              <a:cs typeface="Arial" panose="020B0604020202020204" pitchFamily="34" charset="0"/>
-            </a:endParaRPr>
-          </a:p>
-        </p:txBody>
-      </p:sp>
-      <p:sp>
-        <p:nvSpPr>
-          <p:cNvPr id="15" name="TextBox 14"/>
-          <p:cNvSpPr txBox="1"/>
-          <p:nvPr/>
-        </p:nvSpPr>
-        <p:spPr>
-          <a:xfrm>
-            <a:off x="1237440" y="5853723"/>
-            <a:ext cx="8816131" cy="369332"/>
-          </a:xfrm>
-          <a:prstGeom prst="rect">
-            <a:avLst/>
-          </a:prstGeom>
-          <a:noFill/>
-        </p:spPr>
-        <p:txBody>
-          <a:bodyPr wrap="none" rtlCol="0">
-            <a:spAutoFit/>
-          </a:bodyPr>
-          <a:lstStyle/>
-          <a:p>
-            <a:r>
-              <a:rPr lang="en-US" dirty="0" smtClean="0"/>
-              <a:t>default =  start warm-up at sunrise + 2 hours of foraging + b_3 = 0.5 + constant temperature </a:t>
-            </a:r>
-            <a:endParaRPr lang="en-US" dirty="0"/>
-          </a:p>
-        </p:txBody>
-      </p:sp>
-      <p:sp>
-        <p:nvSpPr>
-          <p:cNvPr id="16" name="TextBox 15"/>
-          <p:cNvSpPr txBox="1"/>
-          <p:nvPr/>
-        </p:nvSpPr>
-        <p:spPr>
-          <a:xfrm>
-            <a:off x="8838303" y="3169187"/>
-            <a:ext cx="2050241" cy="338554"/>
-          </a:xfrm>
-          <a:prstGeom prst="rect">
-            <a:avLst/>
-          </a:prstGeom>
-          <a:noFill/>
-        </p:spPr>
-        <p:txBody>
-          <a:bodyPr wrap="none" rtlCol="0">
-            <a:spAutoFit/>
-          </a:bodyPr>
-          <a:lstStyle/>
-          <a:p>
-            <a:r>
-              <a:rPr lang="en-US" sz="1600" dirty="0" smtClean="0">
-                <a:latin typeface="Arial" panose="020B0604020202020204" pitchFamily="34" charset="0"/>
-                <a:cs typeface="Arial" panose="020B0604020202020204" pitchFamily="34" charset="0"/>
-              </a:rPr>
-              <a:t>Total foraging = 4hrs</a:t>
-            </a:r>
-            <a:endParaRPr lang="en-US" sz="1600" dirty="0">
-              <a:latin typeface="Arial" panose="020B0604020202020204" pitchFamily="34" charset="0"/>
-              <a:cs typeface="Arial" panose="020B0604020202020204" pitchFamily="34" charset="0"/>
-            </a:endParaRPr>
-          </a:p>
-        </p:txBody>
-      </p:sp>
-      <p:sp>
-        <p:nvSpPr>
-          <p:cNvPr id="17" name="TextBox 16"/>
-          <p:cNvSpPr txBox="1"/>
-          <p:nvPr/>
-        </p:nvSpPr>
-        <p:spPr>
-          <a:xfrm>
-            <a:off x="8432177" y="547125"/>
-            <a:ext cx="2666499" cy="338554"/>
-          </a:xfrm>
-          <a:prstGeom prst="rect">
-            <a:avLst/>
-          </a:prstGeom>
-          <a:noFill/>
-        </p:spPr>
-        <p:txBody>
-          <a:bodyPr wrap="none" rtlCol="0">
-            <a:spAutoFit/>
-          </a:bodyPr>
-          <a:lstStyle/>
-          <a:p>
-            <a:r>
-              <a:rPr lang="en-US" sz="1600" dirty="0" smtClean="0">
-                <a:latin typeface="Arial" panose="020B0604020202020204" pitchFamily="34" charset="0"/>
-                <a:cs typeface="Arial" panose="020B0604020202020204" pitchFamily="34" charset="0"/>
-              </a:rPr>
-              <a:t>Warm-up 3hrs after sunrise</a:t>
-            </a:r>
-            <a:endParaRPr lang="en-US" sz="1600" dirty="0">
-              <a:latin typeface="Arial" panose="020B0604020202020204" pitchFamily="34" charset="0"/>
-              <a:cs typeface="Arial" panose="020B0604020202020204" pitchFamily="34" charset="0"/>
-            </a:endParaRPr>
-          </a:p>
-        </p:txBody>
-      </p:sp>
-    </p:spTree>
-    <p:extLst>
-      <p:ext uri="{BB962C8B-B14F-4D97-AF65-F5344CB8AC3E}">
-        <p14:creationId xmlns:p14="http://schemas.microsoft.com/office/powerpoint/2010/main" val="3082456281"/>
+        <p14:creationId xmlns:p14="http://schemas.microsoft.com/office/powerpoint/2010/main" val="1220949923"/>
       </p:ext>
     </p:extLst>
   </p:cSld>
@@ -5579,37 +5671,7 @@
       </p:grpSpPr>
       <p:pic>
         <p:nvPicPr>
-          <p:cNvPr id="3" name="Picture 2"/>
-          <p:cNvPicPr>
-            <a:picLocks noChangeAspect="1"/>
-          </p:cNvPicPr>
-          <p:nvPr/>
-        </p:nvPicPr>
-        <p:blipFill>
-          <a:blip r:embed="rId2">
-            <a:extLst>
-              <a:ext uri="{28A0092B-C50C-407E-A947-70E740481C1C}">
-                <a14:useLocalDpi xmlns:a14="http://schemas.microsoft.com/office/drawing/2010/main" val="0"/>
-              </a:ext>
-            </a:extLst>
-          </a:blip>
-          <a:stretch>
-            <a:fillRect/>
-          </a:stretch>
-        </p:blipFill>
-        <p:spPr>
-          <a:xfrm>
-            <a:off x="4546601" y="2026725"/>
-            <a:ext cx="2998030" cy="1828798"/>
-          </a:xfrm>
-          <a:prstGeom prst="rect">
-            <a:avLst/>
-          </a:prstGeom>
-        </p:spPr>
-      </p:pic>
-      <p:pic>
-        <p:nvPicPr>
-          <p:cNvPr id="5" name="Picture 4"/>
+          <p:cNvPr id="2" name="Picture 1"/>
           <p:cNvPicPr>
             <a:picLocks noChangeAspect="1"/>
           </p:cNvPicPr>
@@ -5629,114 +5691,24 @@
         </p:blipFill>
         <p:spPr>
           <a:xfrm>
-            <a:off x="992555" y="885680"/>
-            <a:ext cx="2998029" cy="1828798"/>
+            <a:off x="1346436" y="735954"/>
+            <a:ext cx="8637536" cy="4920778"/>
           </a:xfrm>
           <a:prstGeom prst="rect">
             <a:avLst/>
           </a:prstGeom>
         </p:spPr>
       </p:pic>
-      <p:pic>
-        <p:nvPicPr>
-          <p:cNvPr id="6" name="Picture 5"/>
-          <p:cNvPicPr>
-            <a:picLocks noChangeAspect="1"/>
-          </p:cNvPicPr>
-          <p:nvPr/>
-        </p:nvPicPr>
-        <p:blipFill>
-          <a:blip r:embed="rId4">
-            <a:extLst>
-              <a:ext uri="{28A0092B-C50C-407E-A947-70E740481C1C}">
-                <a14:useLocalDpi xmlns:a14="http://schemas.microsoft.com/office/drawing/2010/main" val="0"/>
-              </a:ext>
-            </a:extLst>
-          </a:blip>
-          <a:stretch>
-            <a:fillRect/>
-          </a:stretch>
-        </p:blipFill>
-        <p:spPr>
-          <a:xfrm>
-            <a:off x="8100647" y="885680"/>
-            <a:ext cx="2998029" cy="1828798"/>
-          </a:xfrm>
-          <a:prstGeom prst="rect">
-            <a:avLst/>
-          </a:prstGeom>
-        </p:spPr>
-      </p:pic>
-      <p:pic>
-        <p:nvPicPr>
-          <p:cNvPr id="7" name="Picture 6"/>
-          <p:cNvPicPr>
-            <a:picLocks noChangeAspect="1"/>
-          </p:cNvPicPr>
-          <p:nvPr/>
-        </p:nvPicPr>
-        <p:blipFill>
-          <a:blip r:embed="rId5">
-            <a:extLst>
-              <a:ext uri="{28A0092B-C50C-407E-A947-70E740481C1C}">
-                <a14:useLocalDpi xmlns:a14="http://schemas.microsoft.com/office/drawing/2010/main" val="0"/>
-              </a:ext>
-            </a:extLst>
-          </a:blip>
-          <a:stretch>
-            <a:fillRect/>
-          </a:stretch>
-        </p:blipFill>
-        <p:spPr>
-          <a:xfrm>
-            <a:off x="1058341" y="3507741"/>
-            <a:ext cx="2866457" cy="1828800"/>
-          </a:xfrm>
-          <a:prstGeom prst="rect">
-            <a:avLst/>
-          </a:prstGeom>
-        </p:spPr>
-      </p:pic>
-      <p:pic>
-        <p:nvPicPr>
-          <p:cNvPr id="8" name="Picture 7"/>
-          <p:cNvPicPr>
-            <a:picLocks noChangeAspect="1"/>
-          </p:cNvPicPr>
-          <p:nvPr/>
-        </p:nvPicPr>
-        <p:blipFill>
-          <a:blip r:embed="rId6">
-            <a:extLst>
-              <a:ext uri="{28A0092B-C50C-407E-A947-70E740481C1C}">
-                <a14:useLocalDpi xmlns:a14="http://schemas.microsoft.com/office/drawing/2010/main" val="0"/>
-              </a:ext>
-            </a:extLst>
-          </a:blip>
-          <a:stretch>
-            <a:fillRect/>
-          </a:stretch>
-        </p:blipFill>
-        <p:spPr>
-          <a:xfrm>
-            <a:off x="8110413" y="3507742"/>
-            <a:ext cx="2978498" cy="1828798"/>
-          </a:xfrm>
-          <a:prstGeom prst="rect">
-            <a:avLst/>
-          </a:prstGeom>
-        </p:spPr>
-      </p:pic>
-      <p:sp>
-        <p:nvSpPr>
-          <p:cNvPr id="10" name="TextBox 9"/>
+      <p:sp>
+        <p:nvSpPr>
+          <p:cNvPr id="3" name="TextBox 2"/>
           <p:cNvSpPr txBox="1"/>
           <p:nvPr/>
         </p:nvSpPr>
         <p:spPr>
           <a:xfrm>
-            <a:off x="5645506" y="1688170"/>
-            <a:ext cx="800219" cy="338554"/>
+            <a:off x="3892632" y="5627281"/>
+            <a:ext cx="3900427" cy="461665"/>
           </a:xfrm>
           <a:prstGeom prst="rect">
             <a:avLst/>
@@ -5750,13 +5722,13 @@
           <a:lstStyle/>
           <a:p>
             <a:r>
-              <a:rPr lang="en-US" sz="1600" dirty="0" smtClean="0">
+              <a:rPr lang="en-US" sz="2400" dirty="0" smtClean="0">
                 <a:latin typeface="Arial" panose="020B0604020202020204" pitchFamily="34" charset="0"/>
                 <a:cs typeface="Arial" panose="020B0604020202020204" pitchFamily="34" charset="0"/>
               </a:rPr>
-              <a:t>default</a:t>
-            </a:r>
-            <a:endParaRPr lang="en-US" sz="1600" dirty="0">
+              <a:t>Environmental temperature</a:t>
+            </a:r>
+            <a:endParaRPr lang="en-US" sz="2400" dirty="0">
               <a:latin typeface="Arial" panose="020B0604020202020204" pitchFamily="34" charset="0"/>
               <a:cs typeface="Arial" panose="020B0604020202020204" pitchFamily="34" charset="0"/>
             </a:endParaRPr>
@@ -5765,14 +5737,14 @@
       </p:sp>
       <p:sp>
         <p:nvSpPr>
-          <p:cNvPr id="11" name="TextBox 10"/>
+          <p:cNvPr id="4" name="TextBox 3"/>
           <p:cNvSpPr txBox="1"/>
           <p:nvPr/>
         </p:nvSpPr>
         <p:spPr>
-          <a:xfrm>
-            <a:off x="1724125" y="3169187"/>
-            <a:ext cx="1104790" cy="338554"/>
+          <a:xfrm rot="16200000">
+            <a:off x="208902" y="2793842"/>
+            <a:ext cx="1332416" cy="461665"/>
           </a:xfrm>
           <a:prstGeom prst="rect">
             <a:avLst/>
@@ -5786,20 +5758,13 @@
           <a:lstStyle/>
           <a:p>
             <a:r>
-              <a:rPr lang="en-US" sz="1600" dirty="0">
+              <a:rPr lang="en-US" sz="2400" dirty="0" smtClean="0">
                 <a:latin typeface="Arial" panose="020B0604020202020204" pitchFamily="34" charset="0"/>
                 <a:cs typeface="Arial" panose="020B0604020202020204" pitchFamily="34" charset="0"/>
               </a:rPr>
-              <a:t> </a:t>
-            </a:r>
-            <a:r>
-              <a:rPr lang="en-US" sz="1600" dirty="0" smtClean="0">
-                <a:latin typeface="Arial" panose="020B0604020202020204" pitchFamily="34" charset="0"/>
-                <a:cs typeface="Arial" panose="020B0604020202020204" pitchFamily="34" charset="0"/>
-              </a:rPr>
-              <a:t>b3 = 0.75</a:t>
-            </a:r>
-            <a:endParaRPr lang="en-US" sz="1600" dirty="0">
+              <a:t>Net gain</a:t>
+            </a:r>
+            <a:endParaRPr lang="en-US" sz="2400" dirty="0">
               <a:latin typeface="Arial" panose="020B0604020202020204" pitchFamily="34" charset="0"/>
               <a:cs typeface="Arial" panose="020B0604020202020204" pitchFamily="34" charset="0"/>
             </a:endParaRPr>
@@ -5808,14 +5773,14 @@
       </p:sp>
       <p:sp>
         <p:nvSpPr>
-          <p:cNvPr id="13" name="TextBox 12"/>
+          <p:cNvPr id="5" name="TextBox 4"/>
           <p:cNvSpPr txBox="1"/>
           <p:nvPr/>
         </p:nvSpPr>
         <p:spPr>
           <a:xfrm>
-            <a:off x="8838303" y="3169187"/>
-            <a:ext cx="2050241" cy="338554"/>
+            <a:off x="5665204" y="519022"/>
+            <a:ext cx="3044423" cy="369332"/>
           </a:xfrm>
           <a:prstGeom prst="rect">
             <a:avLst/>
@@ -5829,13 +5794,13 @@
           <a:lstStyle/>
           <a:p>
             <a:r>
-              <a:rPr lang="en-US" sz="1600" dirty="0" smtClean="0">
+              <a:rPr lang="en-US" dirty="0" smtClean="0">
                 <a:latin typeface="Arial" panose="020B0604020202020204" pitchFamily="34" charset="0"/>
                 <a:cs typeface="Arial" panose="020B0604020202020204" pitchFamily="34" charset="0"/>
               </a:rPr>
-              <a:t>Total foraging = 4hrs</a:t>
-            </a:r>
-            <a:endParaRPr lang="en-US" sz="1600" dirty="0">
+              <a:t>Halving resource availability</a:t>
+            </a:r>
+            <a:endParaRPr lang="en-US" dirty="0">
               <a:latin typeface="Arial" panose="020B0604020202020204" pitchFamily="34" charset="0"/>
               <a:cs typeface="Arial" panose="020B0604020202020204" pitchFamily="34" charset="0"/>
             </a:endParaRPr>
@@ -5844,14 +5809,14 @@
       </p:sp>
       <p:sp>
         <p:nvSpPr>
-          <p:cNvPr id="14" name="TextBox 13"/>
+          <p:cNvPr id="6" name="TextBox 5"/>
           <p:cNvSpPr txBox="1"/>
           <p:nvPr/>
         </p:nvSpPr>
         <p:spPr>
           <a:xfrm>
-            <a:off x="1477289" y="547125"/>
-            <a:ext cx="2553391" cy="338554"/>
+            <a:off x="2929204" y="519022"/>
+            <a:ext cx="915635" cy="369332"/>
           </a:xfrm>
           <a:prstGeom prst="rect">
             <a:avLst/>
@@ -5865,34 +5830,13 @@
           <a:lstStyle/>
           <a:p>
             <a:r>
-              <a:rPr lang="en-US" sz="1600" dirty="0" err="1" smtClean="0">
+              <a:rPr lang="en-US" dirty="0" smtClean="0">
                 <a:latin typeface="Arial" panose="020B0604020202020204" pitchFamily="34" charset="0"/>
                 <a:cs typeface="Arial" panose="020B0604020202020204" pitchFamily="34" charset="0"/>
               </a:rPr>
-              <a:t>T_max</a:t>
-            </a:r>
-            <a:r>
-              <a:rPr lang="en-US" sz="1600" dirty="0" smtClean="0">
-                <a:latin typeface="Arial" panose="020B0604020202020204" pitchFamily="34" charset="0"/>
-                <a:cs typeface="Arial" panose="020B0604020202020204" pitchFamily="34" charset="0"/>
-              </a:rPr>
-              <a:t> = </a:t>
-            </a:r>
-            <a:r>
-              <a:rPr lang="en-US" sz="1600" dirty="0" err="1" smtClean="0">
-                <a:latin typeface="Arial" panose="020B0604020202020204" pitchFamily="34" charset="0"/>
-                <a:cs typeface="Arial" panose="020B0604020202020204" pitchFamily="34" charset="0"/>
-              </a:rPr>
-              <a:t>T_sunrise</a:t>
-            </a:r>
-            <a:r>
-              <a:rPr lang="en-US" sz="1600" dirty="0" smtClean="0">
-                <a:latin typeface="Arial" panose="020B0604020202020204" pitchFamily="34" charset="0"/>
-                <a:cs typeface="Arial" panose="020B0604020202020204" pitchFamily="34" charset="0"/>
-              </a:rPr>
-              <a:t> +10 C</a:t>
-            </a:r>
-            <a:endParaRPr lang="en-US" sz="1600" dirty="0">
+              <a:t>Default</a:t>
+            </a:r>
+            <a:endParaRPr lang="en-US" dirty="0">
               <a:latin typeface="Arial" panose="020B0604020202020204" pitchFamily="34" charset="0"/>
               <a:cs typeface="Arial" panose="020B0604020202020204" pitchFamily="34" charset="0"/>
             </a:endParaRPr>
@@ -5901,14 +5845,14 @@
       </p:sp>
       <p:sp>
         <p:nvSpPr>
-          <p:cNvPr id="15" name="TextBox 14"/>
+          <p:cNvPr id="7" name="TextBox 6"/>
           <p:cNvSpPr txBox="1"/>
           <p:nvPr/>
         </p:nvSpPr>
         <p:spPr>
           <a:xfrm>
-            <a:off x="8432177" y="547125"/>
-            <a:ext cx="2666499" cy="338554"/>
+            <a:off x="2454714" y="3196343"/>
+            <a:ext cx="1864613" cy="369332"/>
           </a:xfrm>
           <a:prstGeom prst="rect">
             <a:avLst/>
@@ -5922,13 +5866,13 @@
           <a:lstStyle/>
           <a:p>
             <a:r>
-              <a:rPr lang="en-US" sz="1600" dirty="0" smtClean="0">
+              <a:rPr lang="en-US" dirty="0" smtClean="0">
                 <a:latin typeface="Arial" panose="020B0604020202020204" pitchFamily="34" charset="0"/>
                 <a:cs typeface="Arial" panose="020B0604020202020204" pitchFamily="34" charset="0"/>
               </a:rPr>
-              <a:t>Warm-up 3hrs after sunrise</a:t>
-            </a:r>
-            <a:endParaRPr lang="en-US" sz="1600" dirty="0">
+              <a:t>Adding warm-up</a:t>
+            </a:r>
+            <a:endParaRPr lang="en-US" dirty="0">
               <a:latin typeface="Arial" panose="020B0604020202020204" pitchFamily="34" charset="0"/>
               <a:cs typeface="Arial" panose="020B0604020202020204" pitchFamily="34" charset="0"/>
             </a:endParaRPr>
@@ -5937,14 +5881,14 @@
       </p:sp>
       <p:sp>
         <p:nvSpPr>
-          <p:cNvPr id="16" name="TextBox 15"/>
+          <p:cNvPr id="8" name="TextBox 7"/>
           <p:cNvSpPr txBox="1"/>
           <p:nvPr/>
         </p:nvSpPr>
         <p:spPr>
           <a:xfrm>
-            <a:off x="84267" y="6519446"/>
-            <a:ext cx="936475" cy="338554"/>
+            <a:off x="5874108" y="3177280"/>
+            <a:ext cx="2386102" cy="369332"/>
           </a:xfrm>
           <a:prstGeom prst="rect">
             <a:avLst/>
@@ -5958,13 +5902,13 @@
           <a:lstStyle/>
           <a:p>
             <a:r>
-              <a:rPr lang="en-US" sz="1600" dirty="0" smtClean="0">
+              <a:rPr lang="en-US" dirty="0" smtClean="0">
                 <a:latin typeface="Arial" panose="020B0604020202020204" pitchFamily="34" charset="0"/>
                 <a:cs typeface="Arial" panose="020B0604020202020204" pitchFamily="34" charset="0"/>
               </a:rPr>
-              <a:t>Figure 7</a:t>
-            </a:r>
-            <a:endParaRPr lang="en-US" sz="1600" dirty="0">
+              <a:t> Variable temperature</a:t>
+            </a:r>
+            <a:endParaRPr lang="en-US" dirty="0">
               <a:latin typeface="Arial" panose="020B0604020202020204" pitchFamily="34" charset="0"/>
               <a:cs typeface="Arial" panose="020B0604020202020204" pitchFamily="34" charset="0"/>
             </a:endParaRPr>
@@ -5973,14 +5917,14 @@
       </p:sp>
       <p:sp>
         <p:nvSpPr>
-          <p:cNvPr id="17" name="TextBox 16"/>
+          <p:cNvPr id="9" name="TextBox 8"/>
           <p:cNvSpPr txBox="1"/>
           <p:nvPr/>
         </p:nvSpPr>
         <p:spPr>
           <a:xfrm>
-            <a:off x="1237440" y="5853723"/>
-            <a:ext cx="9834744" cy="369332"/>
+            <a:off x="1629172" y="334356"/>
+            <a:ext cx="389850" cy="369332"/>
           </a:xfrm>
           <a:prstGeom prst="rect">
             <a:avLst/>
@@ -5994,17 +5938,184 @@
           <a:lstStyle/>
           <a:p>
             <a:r>
-              <a:rPr lang="en-US" dirty="0" smtClean="0"/>
-              <a:t>default =  start warm-up 3 hours after sunrise + 2 hours of foraging + b_3 = 0.5 + constant temperature </a:t>
-            </a:r>
-            <a:endParaRPr lang="en-US" dirty="0"/>
+              <a:rPr lang="en-US" dirty="0" smtClean="0">
+                <a:latin typeface="Arial" panose="020B0604020202020204" pitchFamily="34" charset="0"/>
+                <a:cs typeface="Arial" panose="020B0604020202020204" pitchFamily="34" charset="0"/>
+              </a:rPr>
+              <a:t>a)</a:t>
+            </a:r>
+            <a:endParaRPr lang="en-US" dirty="0">
+              <a:latin typeface="Arial" panose="020B0604020202020204" pitchFamily="34" charset="0"/>
+              <a:cs typeface="Arial" panose="020B0604020202020204" pitchFamily="34" charset="0"/>
+            </a:endParaRPr>
+          </a:p>
+        </p:txBody>
+      </p:sp>
+      <p:sp>
+        <p:nvSpPr>
+          <p:cNvPr id="10" name="TextBox 9"/>
+          <p:cNvSpPr txBox="1"/>
+          <p:nvPr/>
+        </p:nvSpPr>
+        <p:spPr>
+          <a:xfrm>
+            <a:off x="5232682" y="366622"/>
+            <a:ext cx="389850" cy="369332"/>
+          </a:xfrm>
+          <a:prstGeom prst="rect">
+            <a:avLst/>
+          </a:prstGeom>
+          <a:noFill/>
+        </p:spPr>
+        <p:txBody>
+          <a:bodyPr wrap="none" rtlCol="0">
+            <a:spAutoFit/>
+          </a:bodyPr>
+          <a:lstStyle/>
+          <a:p>
+            <a:r>
+              <a:rPr lang="en-US" dirty="0">
+                <a:latin typeface="Arial" panose="020B0604020202020204" pitchFamily="34" charset="0"/>
+                <a:cs typeface="Arial" panose="020B0604020202020204" pitchFamily="34" charset="0"/>
+              </a:rPr>
+              <a:t>b</a:t>
+            </a:r>
+            <a:r>
+              <a:rPr lang="en-US" dirty="0" smtClean="0">
+                <a:latin typeface="Arial" panose="020B0604020202020204" pitchFamily="34" charset="0"/>
+                <a:cs typeface="Arial" panose="020B0604020202020204" pitchFamily="34" charset="0"/>
+              </a:rPr>
+              <a:t>)</a:t>
+            </a:r>
+            <a:endParaRPr lang="en-US" dirty="0">
+              <a:latin typeface="Arial" panose="020B0604020202020204" pitchFamily="34" charset="0"/>
+              <a:cs typeface="Arial" panose="020B0604020202020204" pitchFamily="34" charset="0"/>
+            </a:endParaRPr>
+          </a:p>
+        </p:txBody>
+      </p:sp>
+      <p:sp>
+        <p:nvSpPr>
+          <p:cNvPr id="11" name="TextBox 10"/>
+          <p:cNvSpPr txBox="1"/>
+          <p:nvPr/>
+        </p:nvSpPr>
+        <p:spPr>
+          <a:xfrm>
+            <a:off x="1654572" y="3026756"/>
+            <a:ext cx="377026" cy="369332"/>
+          </a:xfrm>
+          <a:prstGeom prst="rect">
+            <a:avLst/>
+          </a:prstGeom>
+          <a:noFill/>
+        </p:spPr>
+        <p:txBody>
+          <a:bodyPr wrap="none" rtlCol="0">
+            <a:spAutoFit/>
+          </a:bodyPr>
+          <a:lstStyle/>
+          <a:p>
+            <a:r>
+              <a:rPr lang="en-US" dirty="0">
+                <a:latin typeface="Arial" panose="020B0604020202020204" pitchFamily="34" charset="0"/>
+                <a:cs typeface="Arial" panose="020B0604020202020204" pitchFamily="34" charset="0"/>
+              </a:rPr>
+              <a:t>c</a:t>
+            </a:r>
+            <a:r>
+              <a:rPr lang="en-US" dirty="0" smtClean="0">
+                <a:latin typeface="Arial" panose="020B0604020202020204" pitchFamily="34" charset="0"/>
+                <a:cs typeface="Arial" panose="020B0604020202020204" pitchFamily="34" charset="0"/>
+              </a:rPr>
+              <a:t>)</a:t>
+            </a:r>
+            <a:endParaRPr lang="en-US" dirty="0">
+              <a:latin typeface="Arial" panose="020B0604020202020204" pitchFamily="34" charset="0"/>
+              <a:cs typeface="Arial" panose="020B0604020202020204" pitchFamily="34" charset="0"/>
+            </a:endParaRPr>
+          </a:p>
+        </p:txBody>
+      </p:sp>
+      <p:sp>
+        <p:nvSpPr>
+          <p:cNvPr id="12" name="TextBox 11"/>
+          <p:cNvSpPr txBox="1"/>
+          <p:nvPr/>
+        </p:nvSpPr>
+        <p:spPr>
+          <a:xfrm>
+            <a:off x="5258082" y="3059022"/>
+            <a:ext cx="389850" cy="369332"/>
+          </a:xfrm>
+          <a:prstGeom prst="rect">
+            <a:avLst/>
+          </a:prstGeom>
+          <a:noFill/>
+        </p:spPr>
+        <p:txBody>
+          <a:bodyPr wrap="none" rtlCol="0">
+            <a:spAutoFit/>
+          </a:bodyPr>
+          <a:lstStyle/>
+          <a:p>
+            <a:r>
+              <a:rPr lang="en-US" dirty="0" smtClean="0">
+                <a:latin typeface="Arial" panose="020B0604020202020204" pitchFamily="34" charset="0"/>
+                <a:cs typeface="Arial" panose="020B0604020202020204" pitchFamily="34" charset="0"/>
+              </a:rPr>
+              <a:t>d)</a:t>
+            </a:r>
+            <a:endParaRPr lang="en-US" dirty="0">
+              <a:latin typeface="Arial" panose="020B0604020202020204" pitchFamily="34" charset="0"/>
+              <a:cs typeface="Arial" panose="020B0604020202020204" pitchFamily="34" charset="0"/>
+            </a:endParaRPr>
+          </a:p>
+        </p:txBody>
+      </p:sp>
+      <p:sp>
+        <p:nvSpPr>
+          <p:cNvPr id="13" name="TextBox 12"/>
+          <p:cNvSpPr txBox="1"/>
+          <p:nvPr/>
+        </p:nvSpPr>
+        <p:spPr>
+          <a:xfrm>
+            <a:off x="84267" y="6265446"/>
+            <a:ext cx="1314784" cy="461665"/>
+          </a:xfrm>
+          <a:prstGeom prst="rect">
+            <a:avLst/>
+          </a:prstGeom>
+          <a:noFill/>
+        </p:spPr>
+        <p:txBody>
+          <a:bodyPr wrap="none" rtlCol="0">
+            <a:spAutoFit/>
+          </a:bodyPr>
+          <a:lstStyle/>
+          <a:p>
+            <a:r>
+              <a:rPr lang="en-US" sz="2400" dirty="0" smtClean="0">
+                <a:latin typeface="Arial" panose="020B0604020202020204" pitchFamily="34" charset="0"/>
+                <a:cs typeface="Arial" panose="020B0604020202020204" pitchFamily="34" charset="0"/>
+              </a:rPr>
+              <a:t>Figure </a:t>
+            </a:r>
+            <a:r>
+              <a:rPr lang="en-US" sz="2400" dirty="0">
+                <a:latin typeface="Arial" panose="020B0604020202020204" pitchFamily="34" charset="0"/>
+                <a:cs typeface="Arial" panose="020B0604020202020204" pitchFamily="34" charset="0"/>
+              </a:rPr>
+              <a:t>5</a:t>
+            </a:r>
           </a:p>
         </p:txBody>
       </p:sp>
     </p:spTree>
     <p:extLst>
       <p:ext uri="{BB962C8B-B14F-4D97-AF65-F5344CB8AC3E}">
-        <p14:creationId xmlns:p14="http://schemas.microsoft.com/office/powerpoint/2010/main" val="3981341454"/>
+        <p14:creationId xmlns:p14="http://schemas.microsoft.com/office/powerpoint/2010/main" val="2199343044"/>
       </p:ext>
     </p:extLst>
   </p:cSld>

</xml_diff>